<commit_message>
L19 Added home work
</commit_message>
<xml_diff>
--- a/Lectures/Lesson 19 - Hibernate. Spring Data.pptx
+++ b/Lectures/Lesson 19 - Hibernate. Spring Data.pptx
@@ -24,8 +24,8 @@
     <p:sldId id="490" r:id="rId15"/>
     <p:sldId id="492" r:id="rId16"/>
     <p:sldId id="493" r:id="rId17"/>
-    <p:sldId id="491" r:id="rId18"/>
-    <p:sldId id="280" r:id="rId19"/>
+    <p:sldId id="280" r:id="rId18"/>
+    <p:sldId id="494" r:id="rId19"/>
   </p:sldIdLst>
   <p:sldSz cx="12192000" cy="6858000"/>
   <p:notesSz cx="6858000" cy="9144000"/>
@@ -145,12 +145,12 @@
             <p14:sldId id="490"/>
             <p14:sldId id="492"/>
             <p14:sldId id="493"/>
-            <p14:sldId id="491"/>
           </p14:sldIdLst>
         </p14:section>
         <p14:section name="Literature" id="{F4306F46-AA62-4AA1-BA49-25DFD2D8502D}">
           <p14:sldIdLst>
             <p14:sldId id="280"/>
+            <p14:sldId id="494"/>
           </p14:sldIdLst>
         </p14:section>
       </p14:sectionLst>
@@ -244,7 +244,7 @@
           <a:p>
             <a:fld id="{5E7CB0B7-702C-4877-BEF1-5BCFBEB1B464}" type="datetimeFigureOut">
               <a:rPr lang="ru-RU" smtClean="0"/>
-              <a:t>03.03.2019</a:t>
+              <a:t>06.03.2019</a:t>
             </a:fld>
             <a:endParaRPr lang="ru-RU"/>
           </a:p>
@@ -1220,7 +1220,7 @@
       </p:grpSpPr>
       <p:sp>
         <p:nvSpPr>
-          <p:cNvPr id="2" name="Місце для зображення 1"/>
+          <p:cNvPr id="2" name="Образ слайда 1"/>
           <p:cNvSpPr>
             <a:spLocks noGrp="1" noRot="1" noChangeAspect="1"/>
           </p:cNvSpPr>
@@ -1232,7 +1232,7 @@
       </p:sp>
       <p:sp>
         <p:nvSpPr>
-          <p:cNvPr id="3" name="Місце для нотаток 2"/>
+          <p:cNvPr id="3" name="Заметки 2"/>
           <p:cNvSpPr>
             <a:spLocks noGrp="1"/>
           </p:cNvSpPr>
@@ -1245,30 +1245,13 @@
           <a:bodyPr/>
           <a:lstStyle/>
           <a:p>
-            <a:pPr marL="0" marR="0" lvl="0" indent="0" algn="l" defTabSz="914400" rtl="0" eaLnBrk="1" fontAlgn="auto" latinLnBrk="0" hangingPunct="1">
-              <a:lnSpc>
-                <a:spcPct val="100000"/>
-              </a:lnSpc>
-              <a:spcBef>
-                <a:spcPts val="0"/>
-              </a:spcBef>
-              <a:spcAft>
-                <a:spcPts val="0"/>
-              </a:spcAft>
-              <a:buClrTx/>
-              <a:buSzTx/>
-              <a:buFontTx/>
-              <a:buNone/>
-              <a:tabLst/>
-              <a:defRPr/>
-            </a:pPr>
-            <a:endParaRPr lang="en-US" dirty="0"/>
-          </a:p>
-        </p:txBody>
-      </p:sp>
-      <p:sp>
-        <p:nvSpPr>
-          <p:cNvPr id="4" name="Місце для номера слайда 3"/>
+            <a:endParaRPr lang="ru-RU" dirty="0"/>
+          </a:p>
+        </p:txBody>
+      </p:sp>
+      <p:sp>
+        <p:nvSpPr>
+          <p:cNvPr id="4" name="Номер слайда 3"/>
           <p:cNvSpPr>
             <a:spLocks noGrp="1"/>
           </p:cNvSpPr>
@@ -1284,90 +1267,6 @@
             <a:fld id="{812D7E2C-03C1-4B92-BBE3-2FB5C5D5BF8B}" type="slidenum">
               <a:rPr lang="ru-RU" smtClean="0"/>
               <a:t>17</a:t>
-            </a:fld>
-            <a:endParaRPr lang="ru-RU"/>
-          </a:p>
-        </p:txBody>
-      </p:sp>
-    </p:spTree>
-    <p:extLst>
-      <p:ext uri="{BB962C8B-B14F-4D97-AF65-F5344CB8AC3E}">
-        <p14:creationId xmlns:p14="http://schemas.microsoft.com/office/powerpoint/2010/main" val="2106756237"/>
-      </p:ext>
-    </p:extLst>
-  </p:cSld>
-  <p:clrMapOvr>
-    <a:masterClrMapping/>
-  </p:clrMapOvr>
-</p:notes>
-</file>
-
-<file path=ppt/notesSlides/notesSlide17.xml><?xml version="1.0" encoding="utf-8"?>
-<p:notes xmlns:a="http://schemas.openxmlformats.org/drawingml/2006/main" xmlns:r="http://schemas.openxmlformats.org/officeDocument/2006/relationships" xmlns:p="http://schemas.openxmlformats.org/presentationml/2006/main">
-  <p:cSld>
-    <p:spTree>
-      <p:nvGrpSpPr>
-        <p:cNvPr id="1" name=""/>
-        <p:cNvGrpSpPr/>
-        <p:nvPr/>
-      </p:nvGrpSpPr>
-      <p:grpSpPr>
-        <a:xfrm>
-          <a:off x="0" y="0"/>
-          <a:ext cx="0" cy="0"/>
-          <a:chOff x="0" y="0"/>
-          <a:chExt cx="0" cy="0"/>
-        </a:xfrm>
-      </p:grpSpPr>
-      <p:sp>
-        <p:nvSpPr>
-          <p:cNvPr id="2" name="Образ слайда 1"/>
-          <p:cNvSpPr>
-            <a:spLocks noGrp="1" noRot="1" noChangeAspect="1"/>
-          </p:cNvSpPr>
-          <p:nvPr>
-            <p:ph type="sldImg"/>
-          </p:nvPr>
-        </p:nvSpPr>
-        <p:spPr/>
-      </p:sp>
-      <p:sp>
-        <p:nvSpPr>
-          <p:cNvPr id="3" name="Заметки 2"/>
-          <p:cNvSpPr>
-            <a:spLocks noGrp="1"/>
-          </p:cNvSpPr>
-          <p:nvPr>
-            <p:ph type="body" idx="1"/>
-          </p:nvPr>
-        </p:nvSpPr>
-        <p:spPr/>
-        <p:txBody>
-          <a:bodyPr/>
-          <a:lstStyle/>
-          <a:p>
-            <a:endParaRPr lang="ru-RU" dirty="0"/>
-          </a:p>
-        </p:txBody>
-      </p:sp>
-      <p:sp>
-        <p:nvSpPr>
-          <p:cNvPr id="4" name="Номер слайда 3"/>
-          <p:cNvSpPr>
-            <a:spLocks noGrp="1"/>
-          </p:cNvSpPr>
-          <p:nvPr>
-            <p:ph type="sldNum" sz="quarter" idx="10"/>
-          </p:nvPr>
-        </p:nvSpPr>
-        <p:spPr/>
-        <p:txBody>
-          <a:bodyPr/>
-          <a:lstStyle/>
-          <a:p>
-            <a:fld id="{812D7E2C-03C1-4B92-BBE3-2FB5C5D5BF8B}" type="slidenum">
-              <a:rPr lang="ru-RU" smtClean="0"/>
-              <a:t>18</a:t>
             </a:fld>
             <a:endParaRPr lang="ru-RU"/>
           </a:p>
@@ -2323,7 +2222,7 @@
           <a:p>
             <a:fld id="{E1EC799A-A6A9-4790-A4B5-6243B17E023C}" type="datetimeFigureOut">
               <a:rPr lang="ru-RU" smtClean="0"/>
-              <a:t>03.03.2019</a:t>
+              <a:t>06.03.2019</a:t>
             </a:fld>
             <a:endParaRPr lang="ru-RU"/>
           </a:p>
@@ -2491,7 +2390,7 @@
           <a:p>
             <a:fld id="{E1EC799A-A6A9-4790-A4B5-6243B17E023C}" type="datetimeFigureOut">
               <a:rPr lang="ru-RU" smtClean="0"/>
-              <a:t>03.03.2019</a:t>
+              <a:t>06.03.2019</a:t>
             </a:fld>
             <a:endParaRPr lang="ru-RU"/>
           </a:p>
@@ -2669,7 +2568,7 @@
           <a:p>
             <a:fld id="{E1EC799A-A6A9-4790-A4B5-6243B17E023C}" type="datetimeFigureOut">
               <a:rPr lang="ru-RU" smtClean="0"/>
-              <a:t>03.03.2019</a:t>
+              <a:t>06.03.2019</a:t>
             </a:fld>
             <a:endParaRPr lang="ru-RU"/>
           </a:p>
@@ -2837,7 +2736,7 @@
           <a:p>
             <a:fld id="{E1EC799A-A6A9-4790-A4B5-6243B17E023C}" type="datetimeFigureOut">
               <a:rPr lang="ru-RU" smtClean="0"/>
-              <a:t>03.03.2019</a:t>
+              <a:t>06.03.2019</a:t>
             </a:fld>
             <a:endParaRPr lang="ru-RU"/>
           </a:p>
@@ -3082,7 +2981,7 @@
           <a:p>
             <a:fld id="{E1EC799A-A6A9-4790-A4B5-6243B17E023C}" type="datetimeFigureOut">
               <a:rPr lang="ru-RU" smtClean="0"/>
-              <a:t>03.03.2019</a:t>
+              <a:t>06.03.2019</a:t>
             </a:fld>
             <a:endParaRPr lang="ru-RU"/>
           </a:p>
@@ -3311,7 +3210,7 @@
           <a:p>
             <a:fld id="{E1EC799A-A6A9-4790-A4B5-6243B17E023C}" type="datetimeFigureOut">
               <a:rPr lang="ru-RU" smtClean="0"/>
-              <a:t>03.03.2019</a:t>
+              <a:t>06.03.2019</a:t>
             </a:fld>
             <a:endParaRPr lang="ru-RU"/>
           </a:p>
@@ -3675,7 +3574,7 @@
           <a:p>
             <a:fld id="{E1EC799A-A6A9-4790-A4B5-6243B17E023C}" type="datetimeFigureOut">
               <a:rPr lang="ru-RU" smtClean="0"/>
-              <a:t>03.03.2019</a:t>
+              <a:t>06.03.2019</a:t>
             </a:fld>
             <a:endParaRPr lang="ru-RU"/>
           </a:p>
@@ -3792,7 +3691,7 @@
           <a:p>
             <a:fld id="{E1EC799A-A6A9-4790-A4B5-6243B17E023C}" type="datetimeFigureOut">
               <a:rPr lang="ru-RU" smtClean="0"/>
-              <a:t>03.03.2019</a:t>
+              <a:t>06.03.2019</a:t>
             </a:fld>
             <a:endParaRPr lang="ru-RU"/>
           </a:p>
@@ -3887,7 +3786,7 @@
           <a:p>
             <a:fld id="{E1EC799A-A6A9-4790-A4B5-6243B17E023C}" type="datetimeFigureOut">
               <a:rPr lang="ru-RU" smtClean="0"/>
-              <a:t>03.03.2019</a:t>
+              <a:t>06.03.2019</a:t>
             </a:fld>
             <a:endParaRPr lang="ru-RU"/>
           </a:p>
@@ -4162,7 +4061,7 @@
           <a:p>
             <a:fld id="{E1EC799A-A6A9-4790-A4B5-6243B17E023C}" type="datetimeFigureOut">
               <a:rPr lang="ru-RU" smtClean="0"/>
-              <a:t>03.03.2019</a:t>
+              <a:t>06.03.2019</a:t>
             </a:fld>
             <a:endParaRPr lang="ru-RU"/>
           </a:p>
@@ -4414,7 +4313,7 @@
           <a:p>
             <a:fld id="{E1EC799A-A6A9-4790-A4B5-6243B17E023C}" type="datetimeFigureOut">
               <a:rPr lang="ru-RU" smtClean="0"/>
-              <a:t>03.03.2019</a:t>
+              <a:t>06.03.2019</a:t>
             </a:fld>
             <a:endParaRPr lang="ru-RU"/>
           </a:p>
@@ -4625,7 +4524,7 @@
           <a:p>
             <a:fld id="{E1EC799A-A6A9-4790-A4B5-6243B17E023C}" type="datetimeFigureOut">
               <a:rPr lang="ru-RU" smtClean="0"/>
-              <a:t>03.03.2019</a:t>
+              <a:t>06.03.2019</a:t>
             </a:fld>
             <a:endParaRPr lang="ru-RU"/>
           </a:p>
@@ -8688,2695 +8587,106 @@
           <a:p>
             <a:r>
               <a:rPr lang="en-US" dirty="0"/>
-              <a:t>Spring </a:t>
-            </a:r>
-            <a:r>
-              <a:rPr lang="en-US" dirty="0" err="1"/>
-              <a:t>Data.Configuration</a:t>
-            </a:r>
-            <a:endParaRPr lang="en-US" dirty="0"/>
-          </a:p>
-        </p:txBody>
-      </p:sp>
-      <p:sp>
-        <p:nvSpPr>
-          <p:cNvPr id="4" name="Rectangle 1">
-            <a:extLst>
-              <a:ext uri="{FF2B5EF4-FFF2-40B4-BE49-F238E27FC236}">
-                <a16:creationId xmlns:a16="http://schemas.microsoft.com/office/drawing/2014/main" id="{D27A98DA-4805-406D-A165-911B26324170}"/>
-              </a:ext>
-            </a:extLst>
-          </p:cNvPr>
-          <p:cNvSpPr>
-            <a:spLocks noGrp="1" noChangeArrowheads="1"/>
+              <a:t>Literature</a:t>
+            </a:r>
+            <a:endParaRPr lang="ru-RU" dirty="0"/>
+          </a:p>
+        </p:txBody>
+      </p:sp>
+      <p:sp>
+        <p:nvSpPr>
+          <p:cNvPr id="3" name="Объект 2"/>
+          <p:cNvSpPr>
+            <a:spLocks noGrp="1"/>
           </p:cNvSpPr>
           <p:nvPr>
             <p:ph idx="1"/>
           </p:nvPr>
         </p:nvSpPr>
-        <p:spPr bwMode="auto">
-          <a:xfrm>
-            <a:off x="838200" y="1739137"/>
-            <a:ext cx="7629012" cy="4524315"/>
-          </a:xfrm>
-          <a:prstGeom prst="rect">
-            <a:avLst/>
-          </a:prstGeom>
-          <a:solidFill>
-            <a:srgbClr val="2B2B2B"/>
-          </a:solidFill>
-          <a:ln>
-            <a:noFill/>
-          </a:ln>
-          <a:effectLst/>
-          <a:extLst>
-            <a:ext uri="{91240B29-F687-4F45-9708-019B960494DF}">
-              <a14:hiddenLine xmlns:a14="http://schemas.microsoft.com/office/drawing/2010/main" w="9525">
-                <a:solidFill>
-                  <a:schemeClr val="tx1"/>
-                </a:solidFill>
-                <a:miter lim="800000"/>
-                <a:headEnd/>
-                <a:tailEnd/>
-              </a14:hiddenLine>
-            </a:ext>
-            <a:ext uri="{AF507438-7753-43E0-B8FC-AC1667EBCBE1}">
-              <a14:hiddenEffects xmlns:a14="http://schemas.microsoft.com/office/drawing/2010/main">
-                <a:effectLst>
-                  <a:outerShdw dist="35921" dir="2700000" algn="ctr" rotWithShape="0">
-                    <a:schemeClr val="bg2"/>
-                  </a:outerShdw>
-                </a:effectLst>
-              </a14:hiddenEffects>
-            </a:ext>
-          </a:extLst>
-        </p:spPr>
-        <p:txBody>
-          <a:bodyPr vert="horz" wrap="none" lIns="91440" tIns="45720" rIns="91440" bIns="45720" numCol="1" anchor="ctr" anchorCtr="0" compatLnSpc="1">
-            <a:prstTxWarp prst="textNoShape">
-              <a:avLst/>
-            </a:prstTxWarp>
-            <a:spAutoFit/>
+        <p:spPr/>
+        <p:txBody>
+          <a:bodyPr>
+            <a:normAutofit/>
           </a:bodyPr>
           <a:lstStyle/>
           <a:p>
-            <a:pPr marL="0" lvl="0" indent="0" eaLnBrk="0" fontAlgn="base" hangingPunct="0">
-              <a:lnSpc>
-                <a:spcPct val="100000"/>
-              </a:lnSpc>
-              <a:spcBef>
-                <a:spcPct val="0"/>
-              </a:spcBef>
-              <a:spcAft>
-                <a:spcPct val="0"/>
-              </a:spcAft>
-              <a:buNone/>
-            </a:pPr>
-            <a:r>
-              <a:rPr kumimoji="0" lang="en-US" altLang="en-US" sz="900" b="0" i="0" u="none" strike="noStrike" cap="none" normalizeH="0" baseline="0" dirty="0">
-                <a:ln>
-                  <a:noFill/>
-                </a:ln>
-                <a:solidFill>
-                  <a:srgbClr val="BBB529"/>
-                </a:solidFill>
-                <a:effectLst/>
-                <a:latin typeface="Courier New" panose="02070309020205020404" pitchFamily="49" charset="0"/>
-                <a:cs typeface="Courier New" panose="02070309020205020404" pitchFamily="49" charset="0"/>
-              </a:rPr>
-              <a:t>@Configuration</a:t>
-            </a:r>
-            <a:br>
-              <a:rPr kumimoji="0" lang="en-US" altLang="en-US" sz="900" b="0" i="0" u="none" strike="noStrike" cap="none" normalizeH="0" baseline="0" dirty="0">
-                <a:ln>
-                  <a:noFill/>
-                </a:ln>
-                <a:solidFill>
-                  <a:srgbClr val="BBB529"/>
-                </a:solidFill>
-                <a:effectLst/>
-                <a:latin typeface="Courier New" panose="02070309020205020404" pitchFamily="49" charset="0"/>
-                <a:cs typeface="Courier New" panose="02070309020205020404" pitchFamily="49" charset="0"/>
-              </a:rPr>
-            </a:br>
-            <a:r>
-              <a:rPr kumimoji="0" lang="en-US" altLang="en-US" sz="900" b="0" i="0" u="none" strike="noStrike" cap="none" normalizeH="0" baseline="0" dirty="0">
-                <a:ln>
-                  <a:noFill/>
-                </a:ln>
-                <a:solidFill>
-                  <a:srgbClr val="BBB529"/>
-                </a:solidFill>
-                <a:effectLst/>
-                <a:latin typeface="Courier New" panose="02070309020205020404" pitchFamily="49" charset="0"/>
-                <a:cs typeface="Courier New" panose="02070309020205020404" pitchFamily="49" charset="0"/>
-              </a:rPr>
-              <a:t>@</a:t>
-            </a:r>
-            <a:r>
-              <a:rPr kumimoji="0" lang="en-US" altLang="en-US" sz="900" b="0" i="0" u="none" strike="noStrike" cap="none" normalizeH="0" baseline="0" dirty="0" err="1">
-                <a:ln>
-                  <a:noFill/>
-                </a:ln>
-                <a:solidFill>
-                  <a:srgbClr val="BBB529"/>
-                </a:solidFill>
-                <a:effectLst/>
-                <a:latin typeface="Courier New" panose="02070309020205020404" pitchFamily="49" charset="0"/>
-                <a:cs typeface="Courier New" panose="02070309020205020404" pitchFamily="49" charset="0"/>
-              </a:rPr>
-              <a:t>PropertySource</a:t>
-            </a:r>
-            <a:r>
-              <a:rPr kumimoji="0" lang="en-US" altLang="en-US" sz="900" b="0" i="0" u="none" strike="noStrike" cap="none" normalizeH="0" baseline="0" dirty="0">
-                <a:ln>
-                  <a:noFill/>
-                </a:ln>
-                <a:solidFill>
-                  <a:srgbClr val="A9B7C6"/>
-                </a:solidFill>
-                <a:effectLst/>
-                <a:latin typeface="Courier New" panose="02070309020205020404" pitchFamily="49" charset="0"/>
-                <a:cs typeface="Courier New" panose="02070309020205020404" pitchFamily="49" charset="0"/>
-              </a:rPr>
-              <a:t>(</a:t>
-            </a:r>
-            <a:r>
-              <a:rPr kumimoji="0" lang="en-US" altLang="en-US" sz="900" b="0" i="0" u="none" strike="noStrike" cap="none" normalizeH="0" baseline="0" dirty="0">
-                <a:ln>
-                  <a:noFill/>
-                </a:ln>
-                <a:solidFill>
-                  <a:srgbClr val="6A8759"/>
-                </a:solidFill>
-                <a:effectLst/>
-                <a:latin typeface="Courier New" panose="02070309020205020404" pitchFamily="49" charset="0"/>
-                <a:cs typeface="Courier New" panose="02070309020205020404" pitchFamily="49" charset="0"/>
-              </a:rPr>
-              <a:t>"</a:t>
-            </a:r>
-            <a:r>
-              <a:rPr kumimoji="0" lang="en-US" altLang="en-US" sz="900" b="0" i="0" u="none" strike="noStrike" cap="none" normalizeH="0" baseline="0" dirty="0" err="1">
-                <a:ln>
-                  <a:noFill/>
-                </a:ln>
-                <a:solidFill>
-                  <a:srgbClr val="6A8759"/>
-                </a:solidFill>
-                <a:effectLst/>
-                <a:latin typeface="Courier New" panose="02070309020205020404" pitchFamily="49" charset="0"/>
-                <a:cs typeface="Courier New" panose="02070309020205020404" pitchFamily="49" charset="0"/>
-              </a:rPr>
-              <a:t>classpath:db.properties</a:t>
-            </a:r>
-            <a:r>
-              <a:rPr kumimoji="0" lang="en-US" altLang="en-US" sz="900" b="0" i="0" u="none" strike="noStrike" cap="none" normalizeH="0" baseline="0" dirty="0">
-                <a:ln>
-                  <a:noFill/>
-                </a:ln>
-                <a:solidFill>
-                  <a:srgbClr val="6A8759"/>
-                </a:solidFill>
-                <a:effectLst/>
-                <a:latin typeface="Courier New" panose="02070309020205020404" pitchFamily="49" charset="0"/>
-                <a:cs typeface="Courier New" panose="02070309020205020404" pitchFamily="49" charset="0"/>
-              </a:rPr>
-              <a:t>"</a:t>
-            </a:r>
-            <a:r>
-              <a:rPr kumimoji="0" lang="en-US" altLang="en-US" sz="900" b="0" i="0" u="none" strike="noStrike" cap="none" normalizeH="0" baseline="0" dirty="0">
-                <a:ln>
-                  <a:noFill/>
-                </a:ln>
-                <a:solidFill>
-                  <a:srgbClr val="A9B7C6"/>
-                </a:solidFill>
-                <a:effectLst/>
-                <a:latin typeface="Courier New" panose="02070309020205020404" pitchFamily="49" charset="0"/>
-                <a:cs typeface="Courier New" panose="02070309020205020404" pitchFamily="49" charset="0"/>
-              </a:rPr>
-              <a:t>)</a:t>
-            </a:r>
-            <a:br>
-              <a:rPr kumimoji="0" lang="en-US" altLang="en-US" sz="900" b="0" i="0" u="none" strike="noStrike" cap="none" normalizeH="0" baseline="0" dirty="0">
-                <a:ln>
-                  <a:noFill/>
-                </a:ln>
-                <a:solidFill>
-                  <a:srgbClr val="A9B7C6"/>
-                </a:solidFill>
-                <a:effectLst/>
-                <a:latin typeface="Courier New" panose="02070309020205020404" pitchFamily="49" charset="0"/>
-                <a:cs typeface="Courier New" panose="02070309020205020404" pitchFamily="49" charset="0"/>
-              </a:rPr>
-            </a:br>
-            <a:r>
-              <a:rPr kumimoji="0" lang="en-US" altLang="en-US" sz="900" b="0" i="0" u="none" strike="noStrike" cap="none" normalizeH="0" baseline="0" dirty="0">
-                <a:ln>
-                  <a:noFill/>
-                </a:ln>
-                <a:solidFill>
-                  <a:srgbClr val="BBB529"/>
-                </a:solidFill>
-                <a:effectLst/>
-                <a:latin typeface="Courier New" panose="02070309020205020404" pitchFamily="49" charset="0"/>
-                <a:cs typeface="Courier New" panose="02070309020205020404" pitchFamily="49" charset="0"/>
-              </a:rPr>
-              <a:t>@</a:t>
-            </a:r>
-            <a:r>
-              <a:rPr kumimoji="0" lang="en-US" altLang="en-US" sz="900" b="0" i="0" u="none" strike="noStrike" cap="none" normalizeH="0" baseline="0" dirty="0" err="1">
-                <a:ln>
-                  <a:noFill/>
-                </a:ln>
-                <a:solidFill>
-                  <a:srgbClr val="BBB529"/>
-                </a:solidFill>
-                <a:effectLst/>
-                <a:latin typeface="Courier New" panose="02070309020205020404" pitchFamily="49" charset="0"/>
-                <a:cs typeface="Courier New" panose="02070309020205020404" pitchFamily="49" charset="0"/>
-              </a:rPr>
-              <a:t>EnableJpaRepositories</a:t>
-            </a:r>
-            <a:r>
-              <a:rPr kumimoji="0" lang="en-US" altLang="en-US" sz="900" b="0" i="0" u="none" strike="noStrike" cap="none" normalizeH="0" baseline="0" dirty="0">
-                <a:ln>
-                  <a:noFill/>
-                </a:ln>
-                <a:solidFill>
-                  <a:srgbClr val="A9B7C6"/>
-                </a:solidFill>
-                <a:effectLst/>
-                <a:latin typeface="Courier New" panose="02070309020205020404" pitchFamily="49" charset="0"/>
-                <a:cs typeface="Courier New" panose="02070309020205020404" pitchFamily="49" charset="0"/>
-              </a:rPr>
-              <a:t>(</a:t>
-            </a:r>
-            <a:r>
-              <a:rPr lang="en-US" altLang="en-US" sz="900" dirty="0">
-                <a:solidFill>
-                  <a:srgbClr val="6A8759"/>
-                </a:solidFill>
-                <a:latin typeface="Courier New" panose="02070309020205020404" pitchFamily="49" charset="0"/>
-                <a:cs typeface="Courier New" panose="02070309020205020404" pitchFamily="49" charset="0"/>
-              </a:rPr>
-              <a:t>"org.geekhub.lesson19.</a:t>
-            </a:r>
-            <a:r>
-              <a:rPr kumimoji="0" lang="en-US" altLang="en-US" sz="900" b="0" i="0" u="none" strike="noStrike" cap="none" normalizeH="0" baseline="0" dirty="0">
-                <a:ln>
-                  <a:noFill/>
-                </a:ln>
-                <a:solidFill>
-                  <a:srgbClr val="6A8759"/>
-                </a:solidFill>
-                <a:effectLst/>
-                <a:latin typeface="Courier New" panose="02070309020205020404" pitchFamily="49" charset="0"/>
-                <a:cs typeface="Courier New" panose="02070309020205020404" pitchFamily="49" charset="0"/>
-              </a:rPr>
-              <a:t>repository"</a:t>
-            </a:r>
-            <a:r>
-              <a:rPr kumimoji="0" lang="en-US" altLang="en-US" sz="900" b="0" i="0" u="none" strike="noStrike" cap="none" normalizeH="0" baseline="0" dirty="0">
-                <a:ln>
-                  <a:noFill/>
-                </a:ln>
-                <a:solidFill>
-                  <a:srgbClr val="A9B7C6"/>
-                </a:solidFill>
-                <a:effectLst/>
-                <a:latin typeface="Courier New" panose="02070309020205020404" pitchFamily="49" charset="0"/>
-                <a:cs typeface="Courier New" panose="02070309020205020404" pitchFamily="49" charset="0"/>
-              </a:rPr>
-              <a:t>)</a:t>
-            </a:r>
-            <a:br>
-              <a:rPr kumimoji="0" lang="en-US" altLang="en-US" sz="900" b="0" i="0" u="none" strike="noStrike" cap="none" normalizeH="0" baseline="0" dirty="0">
-                <a:ln>
-                  <a:noFill/>
-                </a:ln>
-                <a:solidFill>
-                  <a:srgbClr val="A9B7C6"/>
-                </a:solidFill>
-                <a:effectLst/>
-                <a:latin typeface="Courier New" panose="02070309020205020404" pitchFamily="49" charset="0"/>
-                <a:cs typeface="Courier New" panose="02070309020205020404" pitchFamily="49" charset="0"/>
-              </a:rPr>
-            </a:br>
-            <a:r>
-              <a:rPr kumimoji="0" lang="en-US" altLang="en-US" sz="900" b="0" i="0" u="none" strike="noStrike" cap="none" normalizeH="0" baseline="0" dirty="0">
-                <a:ln>
-                  <a:noFill/>
-                </a:ln>
-                <a:solidFill>
-                  <a:srgbClr val="CC7832"/>
-                </a:solidFill>
-                <a:effectLst/>
-                <a:latin typeface="Courier New" panose="02070309020205020404" pitchFamily="49" charset="0"/>
-                <a:cs typeface="Courier New" panose="02070309020205020404" pitchFamily="49" charset="0"/>
-              </a:rPr>
-              <a:t>public class </a:t>
-            </a:r>
-            <a:r>
-              <a:rPr kumimoji="0" lang="en-US" altLang="en-US" sz="900" b="0" i="0" u="none" strike="noStrike" cap="none" normalizeH="0" baseline="0" dirty="0" err="1">
-                <a:ln>
-                  <a:noFill/>
-                </a:ln>
-                <a:solidFill>
-                  <a:srgbClr val="A9B7C6"/>
-                </a:solidFill>
-                <a:effectLst/>
-                <a:latin typeface="Courier New" panose="02070309020205020404" pitchFamily="49" charset="0"/>
-                <a:cs typeface="Courier New" panose="02070309020205020404" pitchFamily="49" charset="0"/>
-              </a:rPr>
-              <a:t>DatabaseConfig</a:t>
-            </a:r>
-            <a:r>
-              <a:rPr kumimoji="0" lang="en-US" altLang="en-US" sz="900" b="0" i="0" u="none" strike="noStrike" cap="none" normalizeH="0" baseline="0" dirty="0">
-                <a:ln>
-                  <a:noFill/>
-                </a:ln>
-                <a:solidFill>
-                  <a:srgbClr val="A9B7C6"/>
-                </a:solidFill>
-                <a:effectLst/>
-                <a:latin typeface="Courier New" panose="02070309020205020404" pitchFamily="49" charset="0"/>
-                <a:cs typeface="Courier New" panose="02070309020205020404" pitchFamily="49" charset="0"/>
-              </a:rPr>
-              <a:t> {</a:t>
-            </a:r>
-            <a:br>
-              <a:rPr kumimoji="0" lang="en-US" altLang="en-US" sz="900" b="0" i="0" u="none" strike="noStrike" cap="none" normalizeH="0" baseline="0" dirty="0">
-                <a:ln>
-                  <a:noFill/>
-                </a:ln>
-                <a:solidFill>
-                  <a:srgbClr val="A9B7C6"/>
-                </a:solidFill>
-                <a:effectLst/>
-                <a:latin typeface="Courier New" panose="02070309020205020404" pitchFamily="49" charset="0"/>
-                <a:cs typeface="Courier New" panose="02070309020205020404" pitchFamily="49" charset="0"/>
-              </a:rPr>
-            </a:br>
-            <a:r>
-              <a:rPr kumimoji="0" lang="en-US" altLang="en-US" sz="900" b="0" i="0" u="none" strike="noStrike" cap="none" normalizeH="0" baseline="0" dirty="0">
-                <a:ln>
-                  <a:noFill/>
-                </a:ln>
-                <a:solidFill>
-                  <a:srgbClr val="A9B7C6"/>
-                </a:solidFill>
-                <a:effectLst/>
-                <a:latin typeface="Courier New" panose="02070309020205020404" pitchFamily="49" charset="0"/>
-                <a:cs typeface="Courier New" panose="02070309020205020404" pitchFamily="49" charset="0"/>
-              </a:rPr>
-              <a:t>    </a:t>
-            </a:r>
-            <a:r>
-              <a:rPr kumimoji="0" lang="en-US" altLang="en-US" sz="900" b="0" i="0" u="none" strike="noStrike" cap="none" normalizeH="0" baseline="0" dirty="0">
-                <a:ln>
-                  <a:noFill/>
-                </a:ln>
-                <a:solidFill>
-                  <a:srgbClr val="BBB529"/>
-                </a:solidFill>
-                <a:effectLst/>
-                <a:latin typeface="Courier New" panose="02070309020205020404" pitchFamily="49" charset="0"/>
-                <a:cs typeface="Courier New" panose="02070309020205020404" pitchFamily="49" charset="0"/>
-              </a:rPr>
-              <a:t>@Bean</a:t>
-            </a:r>
-            <a:br>
-              <a:rPr kumimoji="0" lang="en-US" altLang="en-US" sz="900" b="0" i="0" u="none" strike="noStrike" cap="none" normalizeH="0" baseline="0" dirty="0">
-                <a:ln>
-                  <a:noFill/>
-                </a:ln>
-                <a:solidFill>
-                  <a:srgbClr val="BBB529"/>
-                </a:solidFill>
-                <a:effectLst/>
-                <a:latin typeface="Courier New" panose="02070309020205020404" pitchFamily="49" charset="0"/>
-                <a:cs typeface="Courier New" panose="02070309020205020404" pitchFamily="49" charset="0"/>
-              </a:rPr>
-            </a:br>
-            <a:r>
-              <a:rPr kumimoji="0" lang="en-US" altLang="en-US" sz="900" b="0" i="0" u="none" strike="noStrike" cap="none" normalizeH="0" baseline="0" dirty="0">
-                <a:ln>
-                  <a:noFill/>
-                </a:ln>
-                <a:solidFill>
-                  <a:srgbClr val="BBB529"/>
-                </a:solidFill>
-                <a:effectLst/>
-                <a:latin typeface="Courier New" panose="02070309020205020404" pitchFamily="49" charset="0"/>
-                <a:cs typeface="Courier New" panose="02070309020205020404" pitchFamily="49" charset="0"/>
-              </a:rPr>
-              <a:t>    @Primary</a:t>
-            </a:r>
-            <a:br>
-              <a:rPr kumimoji="0" lang="en-US" altLang="en-US" sz="900" b="0" i="0" u="none" strike="noStrike" cap="none" normalizeH="0" baseline="0" dirty="0">
-                <a:ln>
-                  <a:noFill/>
-                </a:ln>
-                <a:solidFill>
-                  <a:srgbClr val="BBB529"/>
-                </a:solidFill>
-                <a:effectLst/>
-                <a:latin typeface="Courier New" panose="02070309020205020404" pitchFamily="49" charset="0"/>
-                <a:cs typeface="Courier New" panose="02070309020205020404" pitchFamily="49" charset="0"/>
-              </a:rPr>
-            </a:br>
-            <a:r>
-              <a:rPr kumimoji="0" lang="en-US" altLang="en-US" sz="900" b="0" i="0" u="none" strike="noStrike" cap="none" normalizeH="0" baseline="0" dirty="0">
-                <a:ln>
-                  <a:noFill/>
-                </a:ln>
-                <a:solidFill>
-                  <a:srgbClr val="BBB529"/>
-                </a:solidFill>
-                <a:effectLst/>
-                <a:latin typeface="Courier New" panose="02070309020205020404" pitchFamily="49" charset="0"/>
-                <a:cs typeface="Courier New" panose="02070309020205020404" pitchFamily="49" charset="0"/>
-              </a:rPr>
-              <a:t>    </a:t>
-            </a:r>
-            <a:r>
-              <a:rPr kumimoji="0" lang="en-US" altLang="en-US" sz="900" b="0" i="0" u="none" strike="noStrike" cap="none" normalizeH="0" baseline="0" dirty="0">
-                <a:ln>
-                  <a:noFill/>
-                </a:ln>
-                <a:solidFill>
-                  <a:srgbClr val="CC7832"/>
-                </a:solidFill>
-                <a:effectLst/>
-                <a:latin typeface="Courier New" panose="02070309020205020404" pitchFamily="49" charset="0"/>
-                <a:cs typeface="Courier New" panose="02070309020205020404" pitchFamily="49" charset="0"/>
-              </a:rPr>
-              <a:t>public </a:t>
-            </a:r>
-            <a:r>
-              <a:rPr kumimoji="0" lang="en-US" altLang="en-US" sz="900" b="0" i="0" u="none" strike="noStrike" cap="none" normalizeH="0" baseline="0" dirty="0" err="1">
-                <a:ln>
-                  <a:noFill/>
-                </a:ln>
-                <a:solidFill>
-                  <a:srgbClr val="A9B7C6"/>
-                </a:solidFill>
-                <a:effectLst/>
-                <a:latin typeface="Courier New" panose="02070309020205020404" pitchFamily="49" charset="0"/>
-                <a:cs typeface="Courier New" panose="02070309020205020404" pitchFamily="49" charset="0"/>
-              </a:rPr>
-              <a:t>DataSource</a:t>
-            </a:r>
-            <a:r>
-              <a:rPr kumimoji="0" lang="en-US" altLang="en-US" sz="900" b="0" i="0" u="none" strike="noStrike" cap="none" normalizeH="0" baseline="0" dirty="0">
-                <a:ln>
-                  <a:noFill/>
-                </a:ln>
-                <a:solidFill>
-                  <a:srgbClr val="A9B7C6"/>
-                </a:solidFill>
-                <a:effectLst/>
-                <a:latin typeface="Courier New" panose="02070309020205020404" pitchFamily="49" charset="0"/>
-                <a:cs typeface="Courier New" panose="02070309020205020404" pitchFamily="49" charset="0"/>
-              </a:rPr>
-              <a:t> </a:t>
-            </a:r>
-            <a:r>
-              <a:rPr kumimoji="0" lang="en-US" altLang="en-US" sz="900" b="0" i="0" u="none" strike="noStrike" cap="none" normalizeH="0" baseline="0" dirty="0" err="1">
-                <a:ln>
-                  <a:noFill/>
-                </a:ln>
-                <a:solidFill>
-                  <a:srgbClr val="FFC66D"/>
-                </a:solidFill>
-                <a:effectLst/>
-                <a:latin typeface="Courier New" panose="02070309020205020404" pitchFamily="49" charset="0"/>
-                <a:cs typeface="Courier New" panose="02070309020205020404" pitchFamily="49" charset="0"/>
-              </a:rPr>
-              <a:t>dataSource</a:t>
-            </a:r>
-            <a:r>
-              <a:rPr kumimoji="0" lang="en-US" altLang="en-US" sz="900" b="0" i="0" u="none" strike="noStrike" cap="none" normalizeH="0" baseline="0" dirty="0">
-                <a:ln>
-                  <a:noFill/>
-                </a:ln>
-                <a:solidFill>
-                  <a:srgbClr val="A9B7C6"/>
-                </a:solidFill>
-                <a:effectLst/>
-                <a:latin typeface="Courier New" panose="02070309020205020404" pitchFamily="49" charset="0"/>
-                <a:cs typeface="Courier New" panose="02070309020205020404" pitchFamily="49" charset="0"/>
-              </a:rPr>
-              <a:t>() {</a:t>
-            </a:r>
-            <a:br>
-              <a:rPr kumimoji="0" lang="en-US" altLang="en-US" sz="900" b="0" i="0" u="none" strike="noStrike" cap="none" normalizeH="0" baseline="0" dirty="0">
-                <a:ln>
-                  <a:noFill/>
-                </a:ln>
-                <a:solidFill>
-                  <a:srgbClr val="A9B7C6"/>
-                </a:solidFill>
-                <a:effectLst/>
-                <a:latin typeface="Courier New" panose="02070309020205020404" pitchFamily="49" charset="0"/>
-                <a:cs typeface="Courier New" panose="02070309020205020404" pitchFamily="49" charset="0"/>
-              </a:rPr>
-            </a:br>
-            <a:r>
-              <a:rPr kumimoji="0" lang="en-US" altLang="en-US" sz="900" b="0" i="0" u="none" strike="noStrike" cap="none" normalizeH="0" baseline="0" dirty="0">
-                <a:ln>
-                  <a:noFill/>
-                </a:ln>
-                <a:solidFill>
-                  <a:srgbClr val="A9B7C6"/>
-                </a:solidFill>
-                <a:effectLst/>
-                <a:latin typeface="Courier New" panose="02070309020205020404" pitchFamily="49" charset="0"/>
-                <a:cs typeface="Courier New" panose="02070309020205020404" pitchFamily="49" charset="0"/>
-              </a:rPr>
-              <a:t>        </a:t>
-            </a:r>
-            <a:r>
-              <a:rPr kumimoji="0" lang="en-US" altLang="en-US" sz="900" b="0" i="0" u="none" strike="noStrike" cap="none" normalizeH="0" baseline="0" dirty="0">
-                <a:ln>
-                  <a:noFill/>
-                </a:ln>
-                <a:solidFill>
-                  <a:srgbClr val="CC7832"/>
-                </a:solidFill>
-                <a:effectLst/>
-                <a:latin typeface="Courier New" panose="02070309020205020404" pitchFamily="49" charset="0"/>
-                <a:cs typeface="Courier New" panose="02070309020205020404" pitchFamily="49" charset="0"/>
-              </a:rPr>
-              <a:t>final </a:t>
-            </a:r>
-            <a:r>
-              <a:rPr kumimoji="0" lang="en-US" altLang="en-US" sz="900" b="0" i="0" u="none" strike="noStrike" cap="none" normalizeH="0" baseline="0" dirty="0" err="1">
-                <a:ln>
-                  <a:noFill/>
-                </a:ln>
-                <a:solidFill>
-                  <a:srgbClr val="A9B7C6"/>
-                </a:solidFill>
-                <a:effectLst/>
-                <a:latin typeface="Courier New" panose="02070309020205020404" pitchFamily="49" charset="0"/>
-                <a:cs typeface="Courier New" panose="02070309020205020404" pitchFamily="49" charset="0"/>
-              </a:rPr>
-              <a:t>SimpleDriverDataSource</a:t>
-            </a:r>
-            <a:r>
-              <a:rPr kumimoji="0" lang="en-US" altLang="en-US" sz="900" b="0" i="0" u="none" strike="noStrike" cap="none" normalizeH="0" baseline="0" dirty="0">
-                <a:ln>
-                  <a:noFill/>
-                </a:ln>
-                <a:solidFill>
-                  <a:srgbClr val="A9B7C6"/>
-                </a:solidFill>
-                <a:effectLst/>
-                <a:latin typeface="Courier New" panose="02070309020205020404" pitchFamily="49" charset="0"/>
-                <a:cs typeface="Courier New" panose="02070309020205020404" pitchFamily="49" charset="0"/>
-              </a:rPr>
-              <a:t> </a:t>
-            </a:r>
-            <a:r>
-              <a:rPr kumimoji="0" lang="en-US" altLang="en-US" sz="900" b="0" i="0" u="none" strike="noStrike" cap="none" normalizeH="0" baseline="0" dirty="0" err="1">
-                <a:ln>
-                  <a:noFill/>
-                </a:ln>
-                <a:solidFill>
-                  <a:srgbClr val="A9B7C6"/>
-                </a:solidFill>
-                <a:effectLst/>
-                <a:latin typeface="Courier New" panose="02070309020205020404" pitchFamily="49" charset="0"/>
-                <a:cs typeface="Courier New" panose="02070309020205020404" pitchFamily="49" charset="0"/>
-              </a:rPr>
-              <a:t>dataSource</a:t>
-            </a:r>
-            <a:r>
-              <a:rPr kumimoji="0" lang="en-US" altLang="en-US" sz="900" b="0" i="0" u="none" strike="noStrike" cap="none" normalizeH="0" baseline="0" dirty="0">
-                <a:ln>
-                  <a:noFill/>
-                </a:ln>
-                <a:solidFill>
-                  <a:srgbClr val="A9B7C6"/>
-                </a:solidFill>
-                <a:effectLst/>
-                <a:latin typeface="Courier New" panose="02070309020205020404" pitchFamily="49" charset="0"/>
-                <a:cs typeface="Courier New" panose="02070309020205020404" pitchFamily="49" charset="0"/>
-              </a:rPr>
-              <a:t> = </a:t>
-            </a:r>
-            <a:r>
-              <a:rPr kumimoji="0" lang="en-US" altLang="en-US" sz="900" b="0" i="0" u="none" strike="noStrike" cap="none" normalizeH="0" baseline="0" dirty="0">
-                <a:ln>
-                  <a:noFill/>
-                </a:ln>
-                <a:solidFill>
-                  <a:srgbClr val="CC7832"/>
-                </a:solidFill>
-                <a:effectLst/>
-                <a:latin typeface="Courier New" panose="02070309020205020404" pitchFamily="49" charset="0"/>
-                <a:cs typeface="Courier New" panose="02070309020205020404" pitchFamily="49" charset="0"/>
-              </a:rPr>
-              <a:t>new </a:t>
-            </a:r>
-            <a:r>
-              <a:rPr kumimoji="0" lang="en-US" altLang="en-US" sz="900" b="0" i="0" u="none" strike="noStrike" cap="none" normalizeH="0" baseline="0" dirty="0" err="1">
-                <a:ln>
-                  <a:noFill/>
-                </a:ln>
-                <a:solidFill>
-                  <a:srgbClr val="A9B7C6"/>
-                </a:solidFill>
-                <a:effectLst/>
-                <a:latin typeface="Courier New" panose="02070309020205020404" pitchFamily="49" charset="0"/>
-                <a:cs typeface="Courier New" panose="02070309020205020404" pitchFamily="49" charset="0"/>
-              </a:rPr>
-              <a:t>SimpleDriverDataSource</a:t>
-            </a:r>
-            <a:r>
-              <a:rPr kumimoji="0" lang="en-US" altLang="en-US" sz="900" b="0" i="0" u="none" strike="noStrike" cap="none" normalizeH="0" baseline="0" dirty="0">
-                <a:ln>
-                  <a:noFill/>
-                </a:ln>
-                <a:solidFill>
-                  <a:srgbClr val="A9B7C6"/>
-                </a:solidFill>
-                <a:effectLst/>
-                <a:latin typeface="Courier New" panose="02070309020205020404" pitchFamily="49" charset="0"/>
-                <a:cs typeface="Courier New" panose="02070309020205020404" pitchFamily="49" charset="0"/>
-              </a:rPr>
-              <a:t>()</a:t>
-            </a:r>
-            <a:r>
-              <a:rPr kumimoji="0" lang="en-US" altLang="en-US" sz="900" b="0" i="0" u="none" strike="noStrike" cap="none" normalizeH="0" baseline="0" dirty="0">
-                <a:ln>
-                  <a:noFill/>
-                </a:ln>
-                <a:solidFill>
-                  <a:srgbClr val="CC7832"/>
-                </a:solidFill>
-                <a:effectLst/>
-                <a:latin typeface="Courier New" panose="02070309020205020404" pitchFamily="49" charset="0"/>
-                <a:cs typeface="Courier New" panose="02070309020205020404" pitchFamily="49" charset="0"/>
-              </a:rPr>
-              <a:t>;</a:t>
-            </a:r>
-            <a:br>
-              <a:rPr kumimoji="0" lang="en-US" altLang="en-US" sz="900" b="0" i="0" u="none" strike="noStrike" cap="none" normalizeH="0" baseline="0" dirty="0">
-                <a:ln>
-                  <a:noFill/>
-                </a:ln>
-                <a:solidFill>
-                  <a:srgbClr val="CC7832"/>
-                </a:solidFill>
-                <a:effectLst/>
-                <a:latin typeface="Courier New" panose="02070309020205020404" pitchFamily="49" charset="0"/>
-                <a:cs typeface="Courier New" panose="02070309020205020404" pitchFamily="49" charset="0"/>
-              </a:rPr>
-            </a:br>
-            <a:r>
-              <a:rPr kumimoji="0" lang="en-US" altLang="en-US" sz="900" b="0" i="0" u="none" strike="noStrike" cap="none" normalizeH="0" baseline="0" dirty="0">
-                <a:ln>
-                  <a:noFill/>
-                </a:ln>
-                <a:solidFill>
-                  <a:srgbClr val="CC7832"/>
-                </a:solidFill>
-                <a:effectLst/>
-                <a:latin typeface="Courier New" panose="02070309020205020404" pitchFamily="49" charset="0"/>
-                <a:cs typeface="Courier New" panose="02070309020205020404" pitchFamily="49" charset="0"/>
-              </a:rPr>
-              <a:t>        </a:t>
-            </a:r>
-            <a:r>
-              <a:rPr kumimoji="0" lang="en-US" altLang="en-US" sz="900" b="0" i="0" u="none" strike="noStrike" cap="none" normalizeH="0" baseline="0" dirty="0" err="1">
-                <a:ln>
-                  <a:noFill/>
-                </a:ln>
-                <a:solidFill>
-                  <a:srgbClr val="A9B7C6"/>
-                </a:solidFill>
-                <a:effectLst/>
-                <a:latin typeface="Courier New" panose="02070309020205020404" pitchFamily="49" charset="0"/>
-                <a:cs typeface="Courier New" panose="02070309020205020404" pitchFamily="49" charset="0"/>
-              </a:rPr>
-              <a:t>dataSource.setDriverClass</a:t>
-            </a:r>
-            <a:r>
-              <a:rPr kumimoji="0" lang="en-US" altLang="en-US" sz="900" b="0" i="0" u="none" strike="noStrike" cap="none" normalizeH="0" baseline="0" dirty="0">
-                <a:ln>
-                  <a:noFill/>
-                </a:ln>
-                <a:solidFill>
-                  <a:srgbClr val="A9B7C6"/>
-                </a:solidFill>
-                <a:effectLst/>
-                <a:latin typeface="Courier New" panose="02070309020205020404" pitchFamily="49" charset="0"/>
-                <a:cs typeface="Courier New" panose="02070309020205020404" pitchFamily="49" charset="0"/>
-              </a:rPr>
-              <a:t>(org.h2.Driver.</a:t>
-            </a:r>
-            <a:r>
-              <a:rPr kumimoji="0" lang="en-US" altLang="en-US" sz="900" b="0" i="0" u="none" strike="noStrike" cap="none" normalizeH="0" baseline="0" dirty="0">
-                <a:ln>
-                  <a:noFill/>
-                </a:ln>
-                <a:solidFill>
-                  <a:srgbClr val="CC7832"/>
-                </a:solidFill>
-                <a:effectLst/>
-                <a:latin typeface="Courier New" panose="02070309020205020404" pitchFamily="49" charset="0"/>
-                <a:cs typeface="Courier New" panose="02070309020205020404" pitchFamily="49" charset="0"/>
-              </a:rPr>
-              <a:t>class</a:t>
-            </a:r>
-            <a:r>
-              <a:rPr kumimoji="0" lang="en-US" altLang="en-US" sz="900" b="0" i="0" u="none" strike="noStrike" cap="none" normalizeH="0" baseline="0" dirty="0">
-                <a:ln>
-                  <a:noFill/>
-                </a:ln>
-                <a:solidFill>
-                  <a:srgbClr val="A9B7C6"/>
-                </a:solidFill>
-                <a:effectLst/>
-                <a:latin typeface="Courier New" panose="02070309020205020404" pitchFamily="49" charset="0"/>
-                <a:cs typeface="Courier New" panose="02070309020205020404" pitchFamily="49" charset="0"/>
-              </a:rPr>
-              <a:t>)</a:t>
-            </a:r>
-            <a:r>
-              <a:rPr kumimoji="0" lang="en-US" altLang="en-US" sz="900" b="0" i="0" u="none" strike="noStrike" cap="none" normalizeH="0" baseline="0" dirty="0">
-                <a:ln>
-                  <a:noFill/>
-                </a:ln>
-                <a:solidFill>
-                  <a:srgbClr val="CC7832"/>
-                </a:solidFill>
-                <a:effectLst/>
-                <a:latin typeface="Courier New" panose="02070309020205020404" pitchFamily="49" charset="0"/>
-                <a:cs typeface="Courier New" panose="02070309020205020404" pitchFamily="49" charset="0"/>
-              </a:rPr>
-              <a:t>;</a:t>
-            </a:r>
-            <a:br>
-              <a:rPr kumimoji="0" lang="en-US" altLang="en-US" sz="900" b="0" i="0" u="none" strike="noStrike" cap="none" normalizeH="0" baseline="0" dirty="0">
-                <a:ln>
-                  <a:noFill/>
-                </a:ln>
-                <a:solidFill>
-                  <a:srgbClr val="CC7832"/>
-                </a:solidFill>
-                <a:effectLst/>
-                <a:latin typeface="Courier New" panose="02070309020205020404" pitchFamily="49" charset="0"/>
-                <a:cs typeface="Courier New" panose="02070309020205020404" pitchFamily="49" charset="0"/>
-              </a:rPr>
-            </a:br>
-            <a:r>
-              <a:rPr kumimoji="0" lang="en-US" altLang="en-US" sz="900" b="0" i="0" u="none" strike="noStrike" cap="none" normalizeH="0" baseline="0" dirty="0">
-                <a:ln>
-                  <a:noFill/>
-                </a:ln>
-                <a:solidFill>
-                  <a:srgbClr val="CC7832"/>
-                </a:solidFill>
-                <a:effectLst/>
-                <a:latin typeface="Courier New" panose="02070309020205020404" pitchFamily="49" charset="0"/>
-                <a:cs typeface="Courier New" panose="02070309020205020404" pitchFamily="49" charset="0"/>
-              </a:rPr>
-              <a:t>        </a:t>
-            </a:r>
-            <a:r>
-              <a:rPr kumimoji="0" lang="en-US" altLang="en-US" sz="900" b="0" i="0" u="none" strike="noStrike" cap="none" normalizeH="0" baseline="0" dirty="0" err="1">
-                <a:ln>
-                  <a:noFill/>
-                </a:ln>
-                <a:solidFill>
-                  <a:srgbClr val="A9B7C6"/>
-                </a:solidFill>
-                <a:effectLst/>
-                <a:latin typeface="Courier New" panose="02070309020205020404" pitchFamily="49" charset="0"/>
-                <a:cs typeface="Courier New" panose="02070309020205020404" pitchFamily="49" charset="0"/>
-              </a:rPr>
-              <a:t>dataSource.setUrl</a:t>
-            </a:r>
-            <a:r>
-              <a:rPr kumimoji="0" lang="en-US" altLang="en-US" sz="900" b="0" i="0" u="none" strike="noStrike" cap="none" normalizeH="0" baseline="0" dirty="0">
-                <a:ln>
-                  <a:noFill/>
-                </a:ln>
-                <a:solidFill>
-                  <a:srgbClr val="A9B7C6"/>
-                </a:solidFill>
-                <a:effectLst/>
-                <a:latin typeface="Courier New" panose="02070309020205020404" pitchFamily="49" charset="0"/>
-                <a:cs typeface="Courier New" panose="02070309020205020404" pitchFamily="49" charset="0"/>
-              </a:rPr>
-              <a:t>(</a:t>
-            </a:r>
-            <a:r>
-              <a:rPr kumimoji="0" lang="en-US" altLang="en-US" sz="900" b="0" i="0" u="none" strike="noStrike" cap="none" normalizeH="0" baseline="0" dirty="0">
-                <a:ln>
-                  <a:noFill/>
-                </a:ln>
-                <a:solidFill>
-                  <a:srgbClr val="6A8759"/>
-                </a:solidFill>
-                <a:effectLst/>
-                <a:latin typeface="Courier New" panose="02070309020205020404" pitchFamily="49" charset="0"/>
-                <a:cs typeface="Courier New" panose="02070309020205020404" pitchFamily="49" charset="0"/>
-              </a:rPr>
-              <a:t>"jdbc:h2:mem:lesson19;DB_CLOSE_DELAY=-1"</a:t>
-            </a:r>
-            <a:r>
-              <a:rPr kumimoji="0" lang="en-US" altLang="en-US" sz="900" b="0" i="0" u="none" strike="noStrike" cap="none" normalizeH="0" baseline="0" dirty="0">
-                <a:ln>
-                  <a:noFill/>
-                </a:ln>
-                <a:solidFill>
-                  <a:srgbClr val="A9B7C6"/>
-                </a:solidFill>
-                <a:effectLst/>
-                <a:latin typeface="Courier New" panose="02070309020205020404" pitchFamily="49" charset="0"/>
-                <a:cs typeface="Courier New" panose="02070309020205020404" pitchFamily="49" charset="0"/>
-              </a:rPr>
-              <a:t>)</a:t>
-            </a:r>
-            <a:r>
-              <a:rPr kumimoji="0" lang="en-US" altLang="en-US" sz="900" b="0" i="0" u="none" strike="noStrike" cap="none" normalizeH="0" baseline="0" dirty="0">
-                <a:ln>
-                  <a:noFill/>
-                </a:ln>
-                <a:solidFill>
-                  <a:srgbClr val="CC7832"/>
-                </a:solidFill>
-                <a:effectLst/>
-                <a:latin typeface="Courier New" panose="02070309020205020404" pitchFamily="49" charset="0"/>
-                <a:cs typeface="Courier New" panose="02070309020205020404" pitchFamily="49" charset="0"/>
-              </a:rPr>
-              <a:t>;</a:t>
-            </a:r>
-            <a:br>
-              <a:rPr kumimoji="0" lang="en-US" altLang="en-US" sz="900" b="0" i="0" u="none" strike="noStrike" cap="none" normalizeH="0" baseline="0" dirty="0">
-                <a:ln>
-                  <a:noFill/>
-                </a:ln>
-                <a:solidFill>
-                  <a:srgbClr val="CC7832"/>
-                </a:solidFill>
-                <a:effectLst/>
-                <a:latin typeface="Courier New" panose="02070309020205020404" pitchFamily="49" charset="0"/>
-                <a:cs typeface="Courier New" panose="02070309020205020404" pitchFamily="49" charset="0"/>
-              </a:rPr>
-            </a:br>
-            <a:r>
-              <a:rPr kumimoji="0" lang="en-US" altLang="en-US" sz="900" b="0" i="0" u="none" strike="noStrike" cap="none" normalizeH="0" baseline="0" dirty="0">
-                <a:ln>
-                  <a:noFill/>
-                </a:ln>
-                <a:solidFill>
-                  <a:srgbClr val="CC7832"/>
-                </a:solidFill>
-                <a:effectLst/>
-                <a:latin typeface="Courier New" panose="02070309020205020404" pitchFamily="49" charset="0"/>
-                <a:cs typeface="Courier New" panose="02070309020205020404" pitchFamily="49" charset="0"/>
-              </a:rPr>
-              <a:t>        return </a:t>
-            </a:r>
-            <a:r>
-              <a:rPr kumimoji="0" lang="en-US" altLang="en-US" sz="900" b="0" i="0" u="none" strike="noStrike" cap="none" normalizeH="0" baseline="0" dirty="0" err="1">
-                <a:ln>
-                  <a:noFill/>
-                </a:ln>
-                <a:solidFill>
-                  <a:srgbClr val="A9B7C6"/>
-                </a:solidFill>
-                <a:effectLst/>
-                <a:latin typeface="Courier New" panose="02070309020205020404" pitchFamily="49" charset="0"/>
-                <a:cs typeface="Courier New" panose="02070309020205020404" pitchFamily="49" charset="0"/>
-              </a:rPr>
-              <a:t>dataSource</a:t>
-            </a:r>
-            <a:r>
-              <a:rPr kumimoji="0" lang="en-US" altLang="en-US" sz="900" b="0" i="0" u="none" strike="noStrike" cap="none" normalizeH="0" baseline="0" dirty="0">
-                <a:ln>
-                  <a:noFill/>
-                </a:ln>
-                <a:solidFill>
-                  <a:srgbClr val="CC7832"/>
-                </a:solidFill>
-                <a:effectLst/>
-                <a:latin typeface="Courier New" panose="02070309020205020404" pitchFamily="49" charset="0"/>
-                <a:cs typeface="Courier New" panose="02070309020205020404" pitchFamily="49" charset="0"/>
-              </a:rPr>
-              <a:t>;</a:t>
-            </a:r>
-            <a:br>
-              <a:rPr kumimoji="0" lang="en-US" altLang="en-US" sz="900" b="0" i="0" u="none" strike="noStrike" cap="none" normalizeH="0" baseline="0" dirty="0">
-                <a:ln>
-                  <a:noFill/>
-                </a:ln>
-                <a:solidFill>
-                  <a:srgbClr val="CC7832"/>
-                </a:solidFill>
-                <a:effectLst/>
-                <a:latin typeface="Courier New" panose="02070309020205020404" pitchFamily="49" charset="0"/>
-                <a:cs typeface="Courier New" panose="02070309020205020404" pitchFamily="49" charset="0"/>
-              </a:rPr>
-            </a:br>
-            <a:r>
-              <a:rPr kumimoji="0" lang="en-US" altLang="en-US" sz="900" b="0" i="0" u="none" strike="noStrike" cap="none" normalizeH="0" baseline="0" dirty="0">
-                <a:ln>
-                  <a:noFill/>
-                </a:ln>
-                <a:solidFill>
-                  <a:srgbClr val="CC7832"/>
-                </a:solidFill>
-                <a:effectLst/>
-                <a:latin typeface="Courier New" panose="02070309020205020404" pitchFamily="49" charset="0"/>
-                <a:cs typeface="Courier New" panose="02070309020205020404" pitchFamily="49" charset="0"/>
-              </a:rPr>
-              <a:t>    </a:t>
-            </a:r>
-            <a:r>
-              <a:rPr kumimoji="0" lang="en-US" altLang="en-US" sz="900" b="0" i="0" u="none" strike="noStrike" cap="none" normalizeH="0" baseline="0" dirty="0">
-                <a:ln>
-                  <a:noFill/>
-                </a:ln>
-                <a:solidFill>
-                  <a:srgbClr val="A9B7C6"/>
-                </a:solidFill>
-                <a:effectLst/>
-                <a:latin typeface="Courier New" panose="02070309020205020404" pitchFamily="49" charset="0"/>
-                <a:cs typeface="Courier New" panose="02070309020205020404" pitchFamily="49" charset="0"/>
-              </a:rPr>
-              <a:t>}</a:t>
-            </a:r>
-            <a:br>
-              <a:rPr kumimoji="0" lang="en-US" altLang="en-US" sz="900" b="0" i="0" u="none" strike="noStrike" cap="none" normalizeH="0" baseline="0" dirty="0">
-                <a:ln>
-                  <a:noFill/>
-                </a:ln>
-                <a:solidFill>
-                  <a:srgbClr val="A9B7C6"/>
-                </a:solidFill>
-                <a:effectLst/>
-                <a:latin typeface="Courier New" panose="02070309020205020404" pitchFamily="49" charset="0"/>
-                <a:cs typeface="Courier New" panose="02070309020205020404" pitchFamily="49" charset="0"/>
-              </a:rPr>
-            </a:br>
-            <a:br>
-              <a:rPr kumimoji="0" lang="en-US" altLang="en-US" sz="900" b="0" i="0" u="none" strike="noStrike" cap="none" normalizeH="0" baseline="0" dirty="0">
-                <a:ln>
-                  <a:noFill/>
-                </a:ln>
-                <a:solidFill>
-                  <a:srgbClr val="A9B7C6"/>
-                </a:solidFill>
-                <a:effectLst/>
-                <a:latin typeface="Courier New" panose="02070309020205020404" pitchFamily="49" charset="0"/>
-                <a:cs typeface="Courier New" panose="02070309020205020404" pitchFamily="49" charset="0"/>
-              </a:rPr>
-            </a:br>
-            <a:r>
-              <a:rPr kumimoji="0" lang="en-US" altLang="en-US" sz="900" b="0" i="0" u="none" strike="noStrike" cap="none" normalizeH="0" baseline="0" dirty="0">
-                <a:ln>
-                  <a:noFill/>
-                </a:ln>
-                <a:solidFill>
-                  <a:srgbClr val="A9B7C6"/>
-                </a:solidFill>
-                <a:effectLst/>
-                <a:latin typeface="Courier New" panose="02070309020205020404" pitchFamily="49" charset="0"/>
-                <a:cs typeface="Courier New" panose="02070309020205020404" pitchFamily="49" charset="0"/>
-              </a:rPr>
-              <a:t>    </a:t>
-            </a:r>
-            <a:r>
-              <a:rPr kumimoji="0" lang="en-US" altLang="en-US" sz="900" b="0" i="0" u="none" strike="noStrike" cap="none" normalizeH="0" baseline="0" dirty="0">
-                <a:ln>
-                  <a:noFill/>
-                </a:ln>
-                <a:solidFill>
-                  <a:srgbClr val="BBB529"/>
-                </a:solidFill>
-                <a:effectLst/>
-                <a:latin typeface="Courier New" panose="02070309020205020404" pitchFamily="49" charset="0"/>
-                <a:cs typeface="Courier New" panose="02070309020205020404" pitchFamily="49" charset="0"/>
-              </a:rPr>
-              <a:t>@Bean</a:t>
-            </a:r>
-            <a:br>
-              <a:rPr kumimoji="0" lang="en-US" altLang="en-US" sz="900" b="0" i="0" u="none" strike="noStrike" cap="none" normalizeH="0" baseline="0" dirty="0">
-                <a:ln>
-                  <a:noFill/>
-                </a:ln>
-                <a:solidFill>
-                  <a:srgbClr val="BBB529"/>
-                </a:solidFill>
-                <a:effectLst/>
-                <a:latin typeface="Courier New" panose="02070309020205020404" pitchFamily="49" charset="0"/>
-                <a:cs typeface="Courier New" panose="02070309020205020404" pitchFamily="49" charset="0"/>
-              </a:rPr>
-            </a:br>
-            <a:r>
-              <a:rPr kumimoji="0" lang="en-US" altLang="en-US" sz="900" b="0" i="0" u="none" strike="noStrike" cap="none" normalizeH="0" baseline="0" dirty="0">
-                <a:ln>
-                  <a:noFill/>
-                </a:ln>
-                <a:solidFill>
-                  <a:srgbClr val="BBB529"/>
-                </a:solidFill>
-                <a:effectLst/>
-                <a:latin typeface="Courier New" panose="02070309020205020404" pitchFamily="49" charset="0"/>
-                <a:cs typeface="Courier New" panose="02070309020205020404" pitchFamily="49" charset="0"/>
-              </a:rPr>
-              <a:t>    </a:t>
-            </a:r>
-            <a:r>
-              <a:rPr kumimoji="0" lang="en-US" altLang="en-US" sz="900" b="0" i="0" u="none" strike="noStrike" cap="none" normalizeH="0" baseline="0" dirty="0">
-                <a:ln>
-                  <a:noFill/>
-                </a:ln>
-                <a:solidFill>
-                  <a:srgbClr val="CC7832"/>
-                </a:solidFill>
-                <a:effectLst/>
-                <a:latin typeface="Courier New" panose="02070309020205020404" pitchFamily="49" charset="0"/>
-                <a:cs typeface="Courier New" panose="02070309020205020404" pitchFamily="49" charset="0"/>
-              </a:rPr>
-              <a:t>public </a:t>
-            </a:r>
-            <a:r>
-              <a:rPr kumimoji="0" lang="en-US" altLang="en-US" sz="900" b="0" i="0" u="none" strike="noStrike" cap="none" normalizeH="0" baseline="0" dirty="0" err="1">
-                <a:ln>
-                  <a:noFill/>
-                </a:ln>
-                <a:solidFill>
-                  <a:srgbClr val="A9B7C6"/>
-                </a:solidFill>
-                <a:effectLst/>
-                <a:latin typeface="Courier New" panose="02070309020205020404" pitchFamily="49" charset="0"/>
-                <a:cs typeface="Courier New" panose="02070309020205020404" pitchFamily="49" charset="0"/>
-              </a:rPr>
-              <a:t>EntityManagerFactory</a:t>
-            </a:r>
-            <a:r>
-              <a:rPr kumimoji="0" lang="en-US" altLang="en-US" sz="900" b="0" i="0" u="none" strike="noStrike" cap="none" normalizeH="0" baseline="0" dirty="0">
-                <a:ln>
-                  <a:noFill/>
-                </a:ln>
-                <a:solidFill>
-                  <a:srgbClr val="A9B7C6"/>
-                </a:solidFill>
-                <a:effectLst/>
-                <a:latin typeface="Courier New" panose="02070309020205020404" pitchFamily="49" charset="0"/>
-                <a:cs typeface="Courier New" panose="02070309020205020404" pitchFamily="49" charset="0"/>
-              </a:rPr>
-              <a:t> </a:t>
-            </a:r>
-            <a:r>
-              <a:rPr kumimoji="0" lang="en-US" altLang="en-US" sz="900" b="0" i="0" u="none" strike="noStrike" cap="none" normalizeH="0" baseline="0" dirty="0" err="1">
-                <a:ln>
-                  <a:noFill/>
-                </a:ln>
-                <a:solidFill>
-                  <a:srgbClr val="FFC66D"/>
-                </a:solidFill>
-                <a:effectLst/>
-                <a:latin typeface="Courier New" panose="02070309020205020404" pitchFamily="49" charset="0"/>
-                <a:cs typeface="Courier New" panose="02070309020205020404" pitchFamily="49" charset="0"/>
-              </a:rPr>
-              <a:t>entityManagerFactory</a:t>
-            </a:r>
-            <a:r>
-              <a:rPr kumimoji="0" lang="en-US" altLang="en-US" sz="900" b="0" i="0" u="none" strike="noStrike" cap="none" normalizeH="0" baseline="0" dirty="0">
-                <a:ln>
-                  <a:noFill/>
-                </a:ln>
-                <a:solidFill>
-                  <a:srgbClr val="A9B7C6"/>
-                </a:solidFill>
-                <a:effectLst/>
-                <a:latin typeface="Courier New" panose="02070309020205020404" pitchFamily="49" charset="0"/>
-                <a:cs typeface="Courier New" panose="02070309020205020404" pitchFamily="49" charset="0"/>
-              </a:rPr>
-              <a:t>(Environment </a:t>
-            </a:r>
-            <a:r>
-              <a:rPr kumimoji="0" lang="en-US" altLang="en-US" sz="900" b="0" i="0" u="none" strike="noStrike" cap="none" normalizeH="0" baseline="0" dirty="0" err="1">
-                <a:ln>
-                  <a:noFill/>
-                </a:ln>
-                <a:solidFill>
-                  <a:srgbClr val="A9B7C6"/>
-                </a:solidFill>
-                <a:effectLst/>
-                <a:latin typeface="Courier New" panose="02070309020205020404" pitchFamily="49" charset="0"/>
-                <a:cs typeface="Courier New" panose="02070309020205020404" pitchFamily="49" charset="0"/>
-              </a:rPr>
-              <a:t>environment</a:t>
-            </a:r>
-            <a:r>
-              <a:rPr kumimoji="0" lang="en-US" altLang="en-US" sz="900" b="0" i="0" u="none" strike="noStrike" cap="none" normalizeH="0" baseline="0" dirty="0">
-                <a:ln>
-                  <a:noFill/>
-                </a:ln>
-                <a:solidFill>
-                  <a:srgbClr val="CC7832"/>
-                </a:solidFill>
-                <a:effectLst/>
-                <a:latin typeface="Courier New" panose="02070309020205020404" pitchFamily="49" charset="0"/>
-                <a:cs typeface="Courier New" panose="02070309020205020404" pitchFamily="49" charset="0"/>
-              </a:rPr>
-              <a:t>, </a:t>
-            </a:r>
-            <a:r>
-              <a:rPr kumimoji="0" lang="en-US" altLang="en-US" sz="900" b="0" i="0" u="none" strike="noStrike" cap="none" normalizeH="0" baseline="0" dirty="0" err="1">
-                <a:ln>
-                  <a:noFill/>
-                </a:ln>
-                <a:solidFill>
-                  <a:srgbClr val="A9B7C6"/>
-                </a:solidFill>
-                <a:effectLst/>
-                <a:latin typeface="Courier New" panose="02070309020205020404" pitchFamily="49" charset="0"/>
-                <a:cs typeface="Courier New" panose="02070309020205020404" pitchFamily="49" charset="0"/>
-              </a:rPr>
-              <a:t>DataSource</a:t>
-            </a:r>
-            <a:r>
-              <a:rPr kumimoji="0" lang="en-US" altLang="en-US" sz="900" b="0" i="0" u="none" strike="noStrike" cap="none" normalizeH="0" baseline="0" dirty="0">
-                <a:ln>
-                  <a:noFill/>
-                </a:ln>
-                <a:solidFill>
-                  <a:srgbClr val="A9B7C6"/>
-                </a:solidFill>
-                <a:effectLst/>
-                <a:latin typeface="Courier New" panose="02070309020205020404" pitchFamily="49" charset="0"/>
-                <a:cs typeface="Courier New" panose="02070309020205020404" pitchFamily="49" charset="0"/>
-              </a:rPr>
-              <a:t> </a:t>
-            </a:r>
-            <a:r>
-              <a:rPr kumimoji="0" lang="en-US" altLang="en-US" sz="900" b="0" i="0" u="none" strike="noStrike" cap="none" normalizeH="0" baseline="0" dirty="0" err="1">
-                <a:ln>
-                  <a:noFill/>
-                </a:ln>
-                <a:solidFill>
-                  <a:srgbClr val="A9B7C6"/>
-                </a:solidFill>
-                <a:effectLst/>
-                <a:latin typeface="Courier New" panose="02070309020205020404" pitchFamily="49" charset="0"/>
-                <a:cs typeface="Courier New" panose="02070309020205020404" pitchFamily="49" charset="0"/>
-              </a:rPr>
-              <a:t>dataSource</a:t>
-            </a:r>
-            <a:r>
-              <a:rPr kumimoji="0" lang="en-US" altLang="en-US" sz="900" b="0" i="0" u="none" strike="noStrike" cap="none" normalizeH="0" baseline="0" dirty="0">
-                <a:ln>
-                  <a:noFill/>
-                </a:ln>
-                <a:solidFill>
-                  <a:srgbClr val="A9B7C6"/>
-                </a:solidFill>
-                <a:effectLst/>
-                <a:latin typeface="Courier New" panose="02070309020205020404" pitchFamily="49" charset="0"/>
-                <a:cs typeface="Courier New" panose="02070309020205020404" pitchFamily="49" charset="0"/>
-              </a:rPr>
-              <a:t>) {</a:t>
-            </a:r>
-            <a:br>
-              <a:rPr kumimoji="0" lang="en-US" altLang="en-US" sz="900" b="0" i="0" u="none" strike="noStrike" cap="none" normalizeH="0" baseline="0" dirty="0">
-                <a:ln>
-                  <a:noFill/>
-                </a:ln>
-                <a:solidFill>
-                  <a:srgbClr val="A9B7C6"/>
-                </a:solidFill>
-                <a:effectLst/>
-                <a:latin typeface="Courier New" panose="02070309020205020404" pitchFamily="49" charset="0"/>
-                <a:cs typeface="Courier New" panose="02070309020205020404" pitchFamily="49" charset="0"/>
-              </a:rPr>
-            </a:br>
-            <a:r>
-              <a:rPr kumimoji="0" lang="en-US" altLang="en-US" sz="900" b="0" i="0" u="none" strike="noStrike" cap="none" normalizeH="0" baseline="0" dirty="0">
-                <a:ln>
-                  <a:noFill/>
-                </a:ln>
-                <a:solidFill>
-                  <a:srgbClr val="A9B7C6"/>
-                </a:solidFill>
-                <a:effectLst/>
-                <a:latin typeface="Courier New" panose="02070309020205020404" pitchFamily="49" charset="0"/>
-                <a:cs typeface="Courier New" panose="02070309020205020404" pitchFamily="49" charset="0"/>
-              </a:rPr>
-              <a:t>        </a:t>
-            </a:r>
-            <a:r>
-              <a:rPr kumimoji="0" lang="en-US" altLang="en-US" sz="900" b="0" i="0" u="none" strike="noStrike" cap="none" normalizeH="0" baseline="0" dirty="0">
-                <a:ln>
-                  <a:noFill/>
-                </a:ln>
-                <a:solidFill>
-                  <a:srgbClr val="CC7832"/>
-                </a:solidFill>
-                <a:effectLst/>
-                <a:latin typeface="Courier New" panose="02070309020205020404" pitchFamily="49" charset="0"/>
-                <a:cs typeface="Courier New" panose="02070309020205020404" pitchFamily="49" charset="0"/>
-              </a:rPr>
-              <a:t>final </a:t>
-            </a:r>
-            <a:r>
-              <a:rPr kumimoji="0" lang="en-US" altLang="en-US" sz="900" b="0" i="0" u="none" strike="noStrike" cap="none" normalizeH="0" baseline="0" dirty="0" err="1">
-                <a:ln>
-                  <a:noFill/>
-                </a:ln>
-                <a:solidFill>
-                  <a:srgbClr val="A9B7C6"/>
-                </a:solidFill>
-                <a:effectLst/>
-                <a:latin typeface="Courier New" panose="02070309020205020404" pitchFamily="49" charset="0"/>
-                <a:cs typeface="Courier New" panose="02070309020205020404" pitchFamily="49" charset="0"/>
-              </a:rPr>
-              <a:t>LocalContainerEntityManagerFactoryBean</a:t>
-            </a:r>
-            <a:r>
-              <a:rPr kumimoji="0" lang="en-US" altLang="en-US" sz="900" b="0" i="0" u="none" strike="noStrike" cap="none" normalizeH="0" baseline="0" dirty="0">
-                <a:ln>
-                  <a:noFill/>
-                </a:ln>
-                <a:solidFill>
-                  <a:srgbClr val="A9B7C6"/>
-                </a:solidFill>
-                <a:effectLst/>
-                <a:latin typeface="Courier New" panose="02070309020205020404" pitchFamily="49" charset="0"/>
-                <a:cs typeface="Courier New" panose="02070309020205020404" pitchFamily="49" charset="0"/>
-              </a:rPr>
-              <a:t> factory = </a:t>
-            </a:r>
-            <a:r>
-              <a:rPr kumimoji="0" lang="en-US" altLang="en-US" sz="900" b="0" i="0" u="none" strike="noStrike" cap="none" normalizeH="0" baseline="0" dirty="0">
-                <a:ln>
-                  <a:noFill/>
-                </a:ln>
-                <a:solidFill>
-                  <a:srgbClr val="CC7832"/>
-                </a:solidFill>
-                <a:effectLst/>
-                <a:latin typeface="Courier New" panose="02070309020205020404" pitchFamily="49" charset="0"/>
-                <a:cs typeface="Courier New" panose="02070309020205020404" pitchFamily="49" charset="0"/>
-              </a:rPr>
-              <a:t>new </a:t>
-            </a:r>
-            <a:r>
-              <a:rPr kumimoji="0" lang="en-US" altLang="en-US" sz="900" b="0" i="0" u="none" strike="noStrike" cap="none" normalizeH="0" baseline="0" dirty="0" err="1">
-                <a:ln>
-                  <a:noFill/>
-                </a:ln>
-                <a:solidFill>
-                  <a:srgbClr val="A9B7C6"/>
-                </a:solidFill>
-                <a:effectLst/>
-                <a:latin typeface="Courier New" panose="02070309020205020404" pitchFamily="49" charset="0"/>
-                <a:cs typeface="Courier New" panose="02070309020205020404" pitchFamily="49" charset="0"/>
-              </a:rPr>
-              <a:t>LocalContainerEntityManagerFactoryBean</a:t>
-            </a:r>
-            <a:r>
-              <a:rPr kumimoji="0" lang="en-US" altLang="en-US" sz="900" b="0" i="0" u="none" strike="noStrike" cap="none" normalizeH="0" baseline="0" dirty="0">
-                <a:ln>
-                  <a:noFill/>
-                </a:ln>
-                <a:solidFill>
-                  <a:srgbClr val="A9B7C6"/>
-                </a:solidFill>
-                <a:effectLst/>
-                <a:latin typeface="Courier New" panose="02070309020205020404" pitchFamily="49" charset="0"/>
-                <a:cs typeface="Courier New" panose="02070309020205020404" pitchFamily="49" charset="0"/>
-              </a:rPr>
-              <a:t>()</a:t>
-            </a:r>
-            <a:r>
-              <a:rPr kumimoji="0" lang="en-US" altLang="en-US" sz="900" b="0" i="0" u="none" strike="noStrike" cap="none" normalizeH="0" baseline="0" dirty="0">
-                <a:ln>
-                  <a:noFill/>
-                </a:ln>
-                <a:solidFill>
-                  <a:srgbClr val="CC7832"/>
-                </a:solidFill>
-                <a:effectLst/>
-                <a:latin typeface="Courier New" panose="02070309020205020404" pitchFamily="49" charset="0"/>
-                <a:cs typeface="Courier New" panose="02070309020205020404" pitchFamily="49" charset="0"/>
-              </a:rPr>
-              <a:t>;</a:t>
-            </a:r>
-            <a:br>
-              <a:rPr kumimoji="0" lang="en-US" altLang="en-US" sz="900" b="0" i="0" u="none" strike="noStrike" cap="none" normalizeH="0" baseline="0" dirty="0">
-                <a:ln>
-                  <a:noFill/>
-                </a:ln>
-                <a:solidFill>
-                  <a:srgbClr val="CC7832"/>
-                </a:solidFill>
-                <a:effectLst/>
-                <a:latin typeface="Courier New" panose="02070309020205020404" pitchFamily="49" charset="0"/>
-                <a:cs typeface="Courier New" panose="02070309020205020404" pitchFamily="49" charset="0"/>
-              </a:rPr>
-            </a:br>
-            <a:r>
-              <a:rPr kumimoji="0" lang="en-US" altLang="en-US" sz="900" b="0" i="0" u="none" strike="noStrike" cap="none" normalizeH="0" baseline="0" dirty="0">
-                <a:ln>
-                  <a:noFill/>
-                </a:ln>
-                <a:solidFill>
-                  <a:srgbClr val="CC7832"/>
-                </a:solidFill>
-                <a:effectLst/>
-                <a:latin typeface="Courier New" panose="02070309020205020404" pitchFamily="49" charset="0"/>
-                <a:cs typeface="Courier New" panose="02070309020205020404" pitchFamily="49" charset="0"/>
-              </a:rPr>
-              <a:t>        </a:t>
-            </a:r>
-            <a:r>
-              <a:rPr kumimoji="0" lang="en-US" altLang="en-US" sz="900" b="0" i="0" u="none" strike="noStrike" cap="none" normalizeH="0" baseline="0" dirty="0" err="1">
-                <a:ln>
-                  <a:noFill/>
-                </a:ln>
-                <a:solidFill>
-                  <a:srgbClr val="A9B7C6"/>
-                </a:solidFill>
-                <a:effectLst/>
-                <a:latin typeface="Courier New" panose="02070309020205020404" pitchFamily="49" charset="0"/>
-                <a:cs typeface="Courier New" panose="02070309020205020404" pitchFamily="49" charset="0"/>
-              </a:rPr>
-              <a:t>factory.setJpaVendorAdapter</a:t>
-            </a:r>
-            <a:r>
-              <a:rPr kumimoji="0" lang="en-US" altLang="en-US" sz="900" b="0" i="0" u="none" strike="noStrike" cap="none" normalizeH="0" baseline="0" dirty="0">
-                <a:ln>
-                  <a:noFill/>
-                </a:ln>
-                <a:solidFill>
-                  <a:srgbClr val="A9B7C6"/>
-                </a:solidFill>
-                <a:effectLst/>
-                <a:latin typeface="Courier New" panose="02070309020205020404" pitchFamily="49" charset="0"/>
-                <a:cs typeface="Courier New" panose="02070309020205020404" pitchFamily="49" charset="0"/>
-              </a:rPr>
-              <a:t>(</a:t>
-            </a:r>
-            <a:r>
-              <a:rPr kumimoji="0" lang="en-US" altLang="en-US" sz="900" b="0" i="0" u="none" strike="noStrike" cap="none" normalizeH="0" baseline="0" dirty="0">
-                <a:ln>
-                  <a:noFill/>
-                </a:ln>
-                <a:solidFill>
-                  <a:srgbClr val="CC7832"/>
-                </a:solidFill>
-                <a:effectLst/>
-                <a:latin typeface="Courier New" panose="02070309020205020404" pitchFamily="49" charset="0"/>
-                <a:cs typeface="Courier New" panose="02070309020205020404" pitchFamily="49" charset="0"/>
-              </a:rPr>
-              <a:t>new </a:t>
-            </a:r>
-            <a:r>
-              <a:rPr kumimoji="0" lang="en-US" altLang="en-US" sz="900" b="0" i="0" u="none" strike="noStrike" cap="none" normalizeH="0" baseline="0" dirty="0" err="1">
-                <a:ln>
-                  <a:noFill/>
-                </a:ln>
-                <a:solidFill>
-                  <a:srgbClr val="A9B7C6"/>
-                </a:solidFill>
-                <a:effectLst/>
-                <a:latin typeface="Courier New" panose="02070309020205020404" pitchFamily="49" charset="0"/>
-                <a:cs typeface="Courier New" panose="02070309020205020404" pitchFamily="49" charset="0"/>
-              </a:rPr>
-              <a:t>HibernateJpaVendorAdapter</a:t>
-            </a:r>
-            <a:r>
-              <a:rPr kumimoji="0" lang="en-US" altLang="en-US" sz="900" b="0" i="0" u="none" strike="noStrike" cap="none" normalizeH="0" baseline="0" dirty="0">
-                <a:ln>
-                  <a:noFill/>
-                </a:ln>
-                <a:solidFill>
-                  <a:srgbClr val="A9B7C6"/>
-                </a:solidFill>
-                <a:effectLst/>
-                <a:latin typeface="Courier New" panose="02070309020205020404" pitchFamily="49" charset="0"/>
-                <a:cs typeface="Courier New" panose="02070309020205020404" pitchFamily="49" charset="0"/>
-              </a:rPr>
-              <a:t>())</a:t>
-            </a:r>
-            <a:r>
-              <a:rPr kumimoji="0" lang="en-US" altLang="en-US" sz="900" b="0" i="0" u="none" strike="noStrike" cap="none" normalizeH="0" baseline="0" dirty="0">
-                <a:ln>
-                  <a:noFill/>
-                </a:ln>
-                <a:solidFill>
-                  <a:srgbClr val="CC7832"/>
-                </a:solidFill>
-                <a:effectLst/>
-                <a:latin typeface="Courier New" panose="02070309020205020404" pitchFamily="49" charset="0"/>
-                <a:cs typeface="Courier New" panose="02070309020205020404" pitchFamily="49" charset="0"/>
-              </a:rPr>
-              <a:t>;</a:t>
-            </a:r>
-            <a:br>
-              <a:rPr kumimoji="0" lang="en-US" altLang="en-US" sz="900" b="0" i="0" u="none" strike="noStrike" cap="none" normalizeH="0" baseline="0" dirty="0">
-                <a:ln>
-                  <a:noFill/>
-                </a:ln>
-                <a:solidFill>
-                  <a:srgbClr val="CC7832"/>
-                </a:solidFill>
-                <a:effectLst/>
-                <a:latin typeface="Courier New" panose="02070309020205020404" pitchFamily="49" charset="0"/>
-                <a:cs typeface="Courier New" panose="02070309020205020404" pitchFamily="49" charset="0"/>
-              </a:rPr>
-            </a:br>
-            <a:r>
-              <a:rPr kumimoji="0" lang="en-US" altLang="en-US" sz="900" b="0" i="0" u="none" strike="noStrike" cap="none" normalizeH="0" baseline="0" dirty="0">
-                <a:ln>
-                  <a:noFill/>
-                </a:ln>
-                <a:solidFill>
-                  <a:srgbClr val="CC7832"/>
-                </a:solidFill>
-                <a:effectLst/>
-                <a:latin typeface="Courier New" panose="02070309020205020404" pitchFamily="49" charset="0"/>
-                <a:cs typeface="Courier New" panose="02070309020205020404" pitchFamily="49" charset="0"/>
-              </a:rPr>
-              <a:t>        </a:t>
-            </a:r>
-            <a:r>
-              <a:rPr kumimoji="0" lang="en-US" altLang="en-US" sz="900" b="0" i="0" u="none" strike="noStrike" cap="none" normalizeH="0" baseline="0" dirty="0" err="1">
-                <a:ln>
-                  <a:noFill/>
-                </a:ln>
-                <a:solidFill>
-                  <a:srgbClr val="A9B7C6"/>
-                </a:solidFill>
-                <a:effectLst/>
-                <a:latin typeface="Courier New" panose="02070309020205020404" pitchFamily="49" charset="0"/>
-                <a:cs typeface="Courier New" panose="02070309020205020404" pitchFamily="49" charset="0"/>
-              </a:rPr>
-              <a:t>factory.setPackagesToScan</a:t>
-            </a:r>
-            <a:r>
-              <a:rPr kumimoji="0" lang="en-US" altLang="en-US" sz="900" b="0" i="0" u="none" strike="noStrike" cap="none" normalizeH="0" baseline="0" dirty="0">
-                <a:ln>
-                  <a:noFill/>
-                </a:ln>
-                <a:solidFill>
-                  <a:srgbClr val="A9B7C6"/>
-                </a:solidFill>
-                <a:effectLst/>
-                <a:latin typeface="Courier New" panose="02070309020205020404" pitchFamily="49" charset="0"/>
-                <a:cs typeface="Courier New" panose="02070309020205020404" pitchFamily="49" charset="0"/>
-              </a:rPr>
-              <a:t>(</a:t>
-            </a:r>
-            <a:r>
-              <a:rPr kumimoji="0" lang="en-US" altLang="en-US" sz="900" b="0" i="0" u="none" strike="noStrike" cap="none" normalizeH="0" baseline="0" dirty="0">
-                <a:ln>
-                  <a:noFill/>
-                </a:ln>
-                <a:solidFill>
-                  <a:srgbClr val="6A8759"/>
-                </a:solidFill>
-                <a:effectLst/>
-                <a:latin typeface="Courier New" panose="02070309020205020404" pitchFamily="49" charset="0"/>
-                <a:cs typeface="Courier New" panose="02070309020205020404" pitchFamily="49" charset="0"/>
-              </a:rPr>
-              <a:t>“org.geekhub.lesson19.db.persistence"</a:t>
-            </a:r>
-            <a:r>
-              <a:rPr kumimoji="0" lang="en-US" altLang="en-US" sz="900" b="0" i="0" u="none" strike="noStrike" cap="none" normalizeH="0" baseline="0" dirty="0">
-                <a:ln>
-                  <a:noFill/>
-                </a:ln>
-                <a:solidFill>
-                  <a:srgbClr val="A9B7C6"/>
-                </a:solidFill>
-                <a:effectLst/>
-                <a:latin typeface="Courier New" panose="02070309020205020404" pitchFamily="49" charset="0"/>
-                <a:cs typeface="Courier New" panose="02070309020205020404" pitchFamily="49" charset="0"/>
-              </a:rPr>
-              <a:t>)</a:t>
-            </a:r>
-            <a:r>
-              <a:rPr kumimoji="0" lang="en-US" altLang="en-US" sz="900" b="0" i="0" u="none" strike="noStrike" cap="none" normalizeH="0" baseline="0" dirty="0">
-                <a:ln>
-                  <a:noFill/>
-                </a:ln>
-                <a:solidFill>
-                  <a:srgbClr val="CC7832"/>
-                </a:solidFill>
-                <a:effectLst/>
-                <a:latin typeface="Courier New" panose="02070309020205020404" pitchFamily="49" charset="0"/>
-                <a:cs typeface="Courier New" panose="02070309020205020404" pitchFamily="49" charset="0"/>
-              </a:rPr>
-              <a:t>;</a:t>
-            </a:r>
-            <a:br>
-              <a:rPr kumimoji="0" lang="en-US" altLang="en-US" sz="900" b="0" i="0" u="none" strike="noStrike" cap="none" normalizeH="0" baseline="0" dirty="0">
-                <a:ln>
-                  <a:noFill/>
-                </a:ln>
-                <a:solidFill>
-                  <a:srgbClr val="CC7832"/>
-                </a:solidFill>
-                <a:effectLst/>
-                <a:latin typeface="Courier New" panose="02070309020205020404" pitchFamily="49" charset="0"/>
-                <a:cs typeface="Courier New" panose="02070309020205020404" pitchFamily="49" charset="0"/>
-              </a:rPr>
-            </a:br>
-            <a:r>
-              <a:rPr kumimoji="0" lang="en-US" altLang="en-US" sz="900" b="0" i="0" u="none" strike="noStrike" cap="none" normalizeH="0" baseline="0" dirty="0">
-                <a:ln>
-                  <a:noFill/>
-                </a:ln>
-                <a:solidFill>
-                  <a:srgbClr val="CC7832"/>
-                </a:solidFill>
-                <a:effectLst/>
-                <a:latin typeface="Courier New" panose="02070309020205020404" pitchFamily="49" charset="0"/>
-                <a:cs typeface="Courier New" panose="02070309020205020404" pitchFamily="49" charset="0"/>
-              </a:rPr>
-              <a:t>        </a:t>
-            </a:r>
-            <a:r>
-              <a:rPr kumimoji="0" lang="en-US" altLang="en-US" sz="900" b="0" i="0" u="none" strike="noStrike" cap="none" normalizeH="0" baseline="0" dirty="0" err="1">
-                <a:ln>
-                  <a:noFill/>
-                </a:ln>
-                <a:solidFill>
-                  <a:srgbClr val="A9B7C6"/>
-                </a:solidFill>
-                <a:effectLst/>
-                <a:latin typeface="Courier New" panose="02070309020205020404" pitchFamily="49" charset="0"/>
-                <a:cs typeface="Courier New" panose="02070309020205020404" pitchFamily="49" charset="0"/>
-              </a:rPr>
-              <a:t>factory.setJpaProperties</a:t>
-            </a:r>
-            <a:r>
-              <a:rPr kumimoji="0" lang="en-US" altLang="en-US" sz="900" b="0" i="0" u="none" strike="noStrike" cap="none" normalizeH="0" baseline="0" dirty="0">
-                <a:ln>
-                  <a:noFill/>
-                </a:ln>
-                <a:solidFill>
-                  <a:srgbClr val="A9B7C6"/>
-                </a:solidFill>
-                <a:effectLst/>
-                <a:latin typeface="Courier New" panose="02070309020205020404" pitchFamily="49" charset="0"/>
-                <a:cs typeface="Courier New" panose="02070309020205020404" pitchFamily="49" charset="0"/>
-              </a:rPr>
-              <a:t>(</a:t>
-            </a:r>
-            <a:r>
-              <a:rPr kumimoji="0" lang="en-US" altLang="en-US" sz="900" b="0" i="1" u="none" strike="noStrike" cap="none" normalizeH="0" baseline="0" dirty="0" err="1">
-                <a:ln>
-                  <a:noFill/>
-                </a:ln>
-                <a:solidFill>
-                  <a:srgbClr val="A9B7C6"/>
-                </a:solidFill>
-                <a:effectLst/>
-                <a:latin typeface="Courier New" panose="02070309020205020404" pitchFamily="49" charset="0"/>
-                <a:cs typeface="Courier New" panose="02070309020205020404" pitchFamily="49" charset="0"/>
-              </a:rPr>
-              <a:t>hibernateProperties</a:t>
-            </a:r>
-            <a:r>
-              <a:rPr kumimoji="0" lang="en-US" altLang="en-US" sz="900" b="0" i="0" u="none" strike="noStrike" cap="none" normalizeH="0" baseline="0" dirty="0">
-                <a:ln>
-                  <a:noFill/>
-                </a:ln>
-                <a:solidFill>
-                  <a:srgbClr val="A9B7C6"/>
-                </a:solidFill>
-                <a:effectLst/>
-                <a:latin typeface="Courier New" panose="02070309020205020404" pitchFamily="49" charset="0"/>
-                <a:cs typeface="Courier New" panose="02070309020205020404" pitchFamily="49" charset="0"/>
-              </a:rPr>
-              <a:t>(environment</a:t>
-            </a:r>
-            <a:r>
-              <a:rPr kumimoji="0" lang="en-US" altLang="en-US" sz="900" b="0" i="0" u="none" strike="noStrike" cap="none" normalizeH="0" baseline="0" dirty="0">
-                <a:ln>
-                  <a:noFill/>
-                </a:ln>
-                <a:solidFill>
-                  <a:srgbClr val="CC7832"/>
-                </a:solidFill>
-                <a:effectLst/>
-                <a:latin typeface="Courier New" panose="02070309020205020404" pitchFamily="49" charset="0"/>
-                <a:cs typeface="Courier New" panose="02070309020205020404" pitchFamily="49" charset="0"/>
-              </a:rPr>
-              <a:t>, true</a:t>
-            </a:r>
-            <a:r>
-              <a:rPr kumimoji="0" lang="en-US" altLang="en-US" sz="900" b="0" i="0" u="none" strike="noStrike" cap="none" normalizeH="0" baseline="0" dirty="0">
-                <a:ln>
-                  <a:noFill/>
-                </a:ln>
-                <a:solidFill>
-                  <a:srgbClr val="A9B7C6"/>
-                </a:solidFill>
-                <a:effectLst/>
-                <a:latin typeface="Courier New" panose="02070309020205020404" pitchFamily="49" charset="0"/>
-                <a:cs typeface="Courier New" panose="02070309020205020404" pitchFamily="49" charset="0"/>
-              </a:rPr>
-              <a:t>))</a:t>
-            </a:r>
-            <a:r>
-              <a:rPr kumimoji="0" lang="en-US" altLang="en-US" sz="900" b="0" i="0" u="none" strike="noStrike" cap="none" normalizeH="0" baseline="0" dirty="0">
-                <a:ln>
-                  <a:noFill/>
-                </a:ln>
-                <a:solidFill>
-                  <a:srgbClr val="CC7832"/>
-                </a:solidFill>
-                <a:effectLst/>
-                <a:latin typeface="Courier New" panose="02070309020205020404" pitchFamily="49" charset="0"/>
-                <a:cs typeface="Courier New" panose="02070309020205020404" pitchFamily="49" charset="0"/>
-              </a:rPr>
-              <a:t>;</a:t>
-            </a:r>
-            <a:br>
-              <a:rPr kumimoji="0" lang="en-US" altLang="en-US" sz="900" b="0" i="0" u="none" strike="noStrike" cap="none" normalizeH="0" baseline="0" dirty="0">
-                <a:ln>
-                  <a:noFill/>
-                </a:ln>
-                <a:solidFill>
-                  <a:srgbClr val="CC7832"/>
-                </a:solidFill>
-                <a:effectLst/>
-                <a:latin typeface="Courier New" panose="02070309020205020404" pitchFamily="49" charset="0"/>
-                <a:cs typeface="Courier New" panose="02070309020205020404" pitchFamily="49" charset="0"/>
-              </a:rPr>
-            </a:br>
-            <a:r>
-              <a:rPr kumimoji="0" lang="en-US" altLang="en-US" sz="900" b="0" i="0" u="none" strike="noStrike" cap="none" normalizeH="0" baseline="0" dirty="0">
-                <a:ln>
-                  <a:noFill/>
-                </a:ln>
-                <a:solidFill>
-                  <a:srgbClr val="CC7832"/>
-                </a:solidFill>
-                <a:effectLst/>
-                <a:latin typeface="Courier New" panose="02070309020205020404" pitchFamily="49" charset="0"/>
-                <a:cs typeface="Courier New" panose="02070309020205020404" pitchFamily="49" charset="0"/>
-              </a:rPr>
-              <a:t>        </a:t>
-            </a:r>
-            <a:r>
-              <a:rPr kumimoji="0" lang="en-US" altLang="en-US" sz="900" b="0" i="0" u="none" strike="noStrike" cap="none" normalizeH="0" baseline="0" dirty="0" err="1">
-                <a:ln>
-                  <a:noFill/>
-                </a:ln>
-                <a:solidFill>
-                  <a:srgbClr val="A9B7C6"/>
-                </a:solidFill>
-                <a:effectLst/>
-                <a:latin typeface="Courier New" panose="02070309020205020404" pitchFamily="49" charset="0"/>
-                <a:cs typeface="Courier New" panose="02070309020205020404" pitchFamily="49" charset="0"/>
-              </a:rPr>
-              <a:t>factory.setDataSource</a:t>
-            </a:r>
-            <a:r>
-              <a:rPr kumimoji="0" lang="en-US" altLang="en-US" sz="900" b="0" i="0" u="none" strike="noStrike" cap="none" normalizeH="0" baseline="0" dirty="0">
-                <a:ln>
-                  <a:noFill/>
-                </a:ln>
-                <a:solidFill>
-                  <a:srgbClr val="A9B7C6"/>
-                </a:solidFill>
-                <a:effectLst/>
-                <a:latin typeface="Courier New" panose="02070309020205020404" pitchFamily="49" charset="0"/>
-                <a:cs typeface="Courier New" panose="02070309020205020404" pitchFamily="49" charset="0"/>
-              </a:rPr>
-              <a:t>(</a:t>
-            </a:r>
-            <a:r>
-              <a:rPr kumimoji="0" lang="en-US" altLang="en-US" sz="900" b="0" i="0" u="none" strike="noStrike" cap="none" normalizeH="0" baseline="0" dirty="0" err="1">
-                <a:ln>
-                  <a:noFill/>
-                </a:ln>
-                <a:solidFill>
-                  <a:srgbClr val="A9B7C6"/>
-                </a:solidFill>
-                <a:effectLst/>
-                <a:latin typeface="Courier New" panose="02070309020205020404" pitchFamily="49" charset="0"/>
-                <a:cs typeface="Courier New" panose="02070309020205020404" pitchFamily="49" charset="0"/>
-              </a:rPr>
-              <a:t>dataSource</a:t>
-            </a:r>
-            <a:r>
-              <a:rPr kumimoji="0" lang="en-US" altLang="en-US" sz="900" b="0" i="0" u="none" strike="noStrike" cap="none" normalizeH="0" baseline="0" dirty="0">
-                <a:ln>
-                  <a:noFill/>
-                </a:ln>
-                <a:solidFill>
-                  <a:srgbClr val="A9B7C6"/>
-                </a:solidFill>
-                <a:effectLst/>
-                <a:latin typeface="Courier New" panose="02070309020205020404" pitchFamily="49" charset="0"/>
-                <a:cs typeface="Courier New" panose="02070309020205020404" pitchFamily="49" charset="0"/>
-              </a:rPr>
-              <a:t>)</a:t>
-            </a:r>
-            <a:r>
-              <a:rPr kumimoji="0" lang="en-US" altLang="en-US" sz="900" b="0" i="0" u="none" strike="noStrike" cap="none" normalizeH="0" baseline="0" dirty="0">
-                <a:ln>
-                  <a:noFill/>
-                </a:ln>
-                <a:solidFill>
-                  <a:srgbClr val="CC7832"/>
-                </a:solidFill>
-                <a:effectLst/>
-                <a:latin typeface="Courier New" panose="02070309020205020404" pitchFamily="49" charset="0"/>
-                <a:cs typeface="Courier New" panose="02070309020205020404" pitchFamily="49" charset="0"/>
-              </a:rPr>
-              <a:t>;</a:t>
-            </a:r>
-            <a:br>
-              <a:rPr kumimoji="0" lang="en-US" altLang="en-US" sz="900" b="0" i="0" u="none" strike="noStrike" cap="none" normalizeH="0" baseline="0" dirty="0">
-                <a:ln>
-                  <a:noFill/>
-                </a:ln>
-                <a:solidFill>
-                  <a:srgbClr val="CC7832"/>
-                </a:solidFill>
-                <a:effectLst/>
-                <a:latin typeface="Courier New" panose="02070309020205020404" pitchFamily="49" charset="0"/>
-                <a:cs typeface="Courier New" panose="02070309020205020404" pitchFamily="49" charset="0"/>
-              </a:rPr>
-            </a:br>
-            <a:r>
-              <a:rPr kumimoji="0" lang="en-US" altLang="en-US" sz="900" b="0" i="0" u="none" strike="noStrike" cap="none" normalizeH="0" baseline="0" dirty="0">
-                <a:ln>
-                  <a:noFill/>
-                </a:ln>
-                <a:solidFill>
-                  <a:srgbClr val="CC7832"/>
-                </a:solidFill>
-                <a:effectLst/>
-                <a:latin typeface="Courier New" panose="02070309020205020404" pitchFamily="49" charset="0"/>
-                <a:cs typeface="Courier New" panose="02070309020205020404" pitchFamily="49" charset="0"/>
-              </a:rPr>
-              <a:t>        </a:t>
-            </a:r>
-            <a:r>
-              <a:rPr kumimoji="0" lang="en-US" altLang="en-US" sz="900" b="0" i="0" u="none" strike="noStrike" cap="none" normalizeH="0" baseline="0" dirty="0" err="1">
-                <a:ln>
-                  <a:noFill/>
-                </a:ln>
-                <a:solidFill>
-                  <a:srgbClr val="A9B7C6"/>
-                </a:solidFill>
-                <a:effectLst/>
-                <a:latin typeface="Courier New" panose="02070309020205020404" pitchFamily="49" charset="0"/>
-                <a:cs typeface="Courier New" panose="02070309020205020404" pitchFamily="49" charset="0"/>
-              </a:rPr>
-              <a:t>factory.afterPropertiesSet</a:t>
-            </a:r>
-            <a:r>
-              <a:rPr kumimoji="0" lang="en-US" altLang="en-US" sz="900" b="0" i="0" u="none" strike="noStrike" cap="none" normalizeH="0" baseline="0" dirty="0">
-                <a:ln>
-                  <a:noFill/>
-                </a:ln>
-                <a:solidFill>
-                  <a:srgbClr val="A9B7C6"/>
-                </a:solidFill>
-                <a:effectLst/>
-                <a:latin typeface="Courier New" panose="02070309020205020404" pitchFamily="49" charset="0"/>
-                <a:cs typeface="Courier New" panose="02070309020205020404" pitchFamily="49" charset="0"/>
-              </a:rPr>
-              <a:t>()</a:t>
-            </a:r>
-            <a:r>
-              <a:rPr kumimoji="0" lang="en-US" altLang="en-US" sz="900" b="0" i="0" u="none" strike="noStrike" cap="none" normalizeH="0" baseline="0" dirty="0">
-                <a:ln>
-                  <a:noFill/>
-                </a:ln>
-                <a:solidFill>
-                  <a:srgbClr val="CC7832"/>
-                </a:solidFill>
-                <a:effectLst/>
-                <a:latin typeface="Courier New" panose="02070309020205020404" pitchFamily="49" charset="0"/>
-                <a:cs typeface="Courier New" panose="02070309020205020404" pitchFamily="49" charset="0"/>
-              </a:rPr>
-              <a:t>;</a:t>
-            </a:r>
-            <a:br>
-              <a:rPr kumimoji="0" lang="en-US" altLang="en-US" sz="900" b="0" i="0" u="none" strike="noStrike" cap="none" normalizeH="0" baseline="0" dirty="0">
-                <a:ln>
-                  <a:noFill/>
-                </a:ln>
-                <a:solidFill>
-                  <a:srgbClr val="CC7832"/>
-                </a:solidFill>
-                <a:effectLst/>
-                <a:latin typeface="Courier New" panose="02070309020205020404" pitchFamily="49" charset="0"/>
-                <a:cs typeface="Courier New" panose="02070309020205020404" pitchFamily="49" charset="0"/>
-              </a:rPr>
-            </a:br>
-            <a:r>
-              <a:rPr kumimoji="0" lang="en-US" altLang="en-US" sz="900" b="0" i="0" u="none" strike="noStrike" cap="none" normalizeH="0" baseline="0" dirty="0">
-                <a:ln>
-                  <a:noFill/>
-                </a:ln>
-                <a:solidFill>
-                  <a:srgbClr val="CC7832"/>
-                </a:solidFill>
-                <a:effectLst/>
-                <a:latin typeface="Courier New" panose="02070309020205020404" pitchFamily="49" charset="0"/>
-                <a:cs typeface="Courier New" panose="02070309020205020404" pitchFamily="49" charset="0"/>
-              </a:rPr>
-              <a:t>        return </a:t>
-            </a:r>
-            <a:r>
-              <a:rPr kumimoji="0" lang="en-US" altLang="en-US" sz="900" b="0" i="0" u="none" strike="noStrike" cap="none" normalizeH="0" baseline="0" dirty="0" err="1">
-                <a:ln>
-                  <a:noFill/>
-                </a:ln>
-                <a:solidFill>
-                  <a:srgbClr val="A9B7C6"/>
-                </a:solidFill>
-                <a:effectLst/>
-                <a:latin typeface="Courier New" panose="02070309020205020404" pitchFamily="49" charset="0"/>
-                <a:cs typeface="Courier New" panose="02070309020205020404" pitchFamily="49" charset="0"/>
-              </a:rPr>
-              <a:t>factory.getObject</a:t>
-            </a:r>
-            <a:r>
-              <a:rPr kumimoji="0" lang="en-US" altLang="en-US" sz="900" b="0" i="0" u="none" strike="noStrike" cap="none" normalizeH="0" baseline="0" dirty="0">
-                <a:ln>
-                  <a:noFill/>
-                </a:ln>
-                <a:solidFill>
-                  <a:srgbClr val="A9B7C6"/>
-                </a:solidFill>
-                <a:effectLst/>
-                <a:latin typeface="Courier New" panose="02070309020205020404" pitchFamily="49" charset="0"/>
-                <a:cs typeface="Courier New" panose="02070309020205020404" pitchFamily="49" charset="0"/>
-              </a:rPr>
-              <a:t>()</a:t>
-            </a:r>
-            <a:r>
-              <a:rPr kumimoji="0" lang="en-US" altLang="en-US" sz="900" b="0" i="0" u="none" strike="noStrike" cap="none" normalizeH="0" baseline="0" dirty="0">
-                <a:ln>
-                  <a:noFill/>
-                </a:ln>
-                <a:solidFill>
-                  <a:srgbClr val="CC7832"/>
-                </a:solidFill>
-                <a:effectLst/>
-                <a:latin typeface="Courier New" panose="02070309020205020404" pitchFamily="49" charset="0"/>
-                <a:cs typeface="Courier New" panose="02070309020205020404" pitchFamily="49" charset="0"/>
-              </a:rPr>
-              <a:t>;</a:t>
-            </a:r>
-            <a:br>
-              <a:rPr kumimoji="0" lang="en-US" altLang="en-US" sz="900" b="0" i="0" u="none" strike="noStrike" cap="none" normalizeH="0" baseline="0" dirty="0">
-                <a:ln>
-                  <a:noFill/>
-                </a:ln>
-                <a:solidFill>
-                  <a:srgbClr val="CC7832"/>
-                </a:solidFill>
-                <a:effectLst/>
-                <a:latin typeface="Courier New" panose="02070309020205020404" pitchFamily="49" charset="0"/>
-                <a:cs typeface="Courier New" panose="02070309020205020404" pitchFamily="49" charset="0"/>
-              </a:rPr>
-            </a:br>
-            <a:r>
-              <a:rPr kumimoji="0" lang="en-US" altLang="en-US" sz="900" b="0" i="0" u="none" strike="noStrike" cap="none" normalizeH="0" baseline="0" dirty="0">
-                <a:ln>
-                  <a:noFill/>
-                </a:ln>
-                <a:solidFill>
-                  <a:srgbClr val="CC7832"/>
-                </a:solidFill>
-                <a:effectLst/>
-                <a:latin typeface="Courier New" panose="02070309020205020404" pitchFamily="49" charset="0"/>
-                <a:cs typeface="Courier New" panose="02070309020205020404" pitchFamily="49" charset="0"/>
-              </a:rPr>
-              <a:t>    </a:t>
-            </a:r>
-            <a:r>
-              <a:rPr kumimoji="0" lang="en-US" altLang="en-US" sz="900" b="0" i="0" u="none" strike="noStrike" cap="none" normalizeH="0" baseline="0" dirty="0">
-                <a:ln>
-                  <a:noFill/>
-                </a:ln>
-                <a:solidFill>
-                  <a:srgbClr val="A9B7C6"/>
-                </a:solidFill>
-                <a:effectLst/>
-                <a:latin typeface="Courier New" panose="02070309020205020404" pitchFamily="49" charset="0"/>
-                <a:cs typeface="Courier New" panose="02070309020205020404" pitchFamily="49" charset="0"/>
-              </a:rPr>
-              <a:t>}</a:t>
-            </a:r>
-            <a:br>
-              <a:rPr kumimoji="0" lang="en-US" altLang="en-US" sz="900" b="0" i="0" u="none" strike="noStrike" cap="none" normalizeH="0" baseline="0" dirty="0">
-                <a:ln>
-                  <a:noFill/>
-                </a:ln>
-                <a:solidFill>
-                  <a:srgbClr val="A9B7C6"/>
-                </a:solidFill>
-                <a:effectLst/>
-                <a:latin typeface="Courier New" panose="02070309020205020404" pitchFamily="49" charset="0"/>
-                <a:cs typeface="Courier New" panose="02070309020205020404" pitchFamily="49" charset="0"/>
-              </a:rPr>
-            </a:br>
-            <a:br>
-              <a:rPr kumimoji="0" lang="en-US" altLang="en-US" sz="900" b="0" i="0" u="none" strike="noStrike" cap="none" normalizeH="0" baseline="0" dirty="0">
-                <a:ln>
-                  <a:noFill/>
-                </a:ln>
-                <a:solidFill>
-                  <a:srgbClr val="A9B7C6"/>
-                </a:solidFill>
-                <a:effectLst/>
-                <a:latin typeface="Courier New" panose="02070309020205020404" pitchFamily="49" charset="0"/>
-                <a:cs typeface="Courier New" panose="02070309020205020404" pitchFamily="49" charset="0"/>
-              </a:rPr>
-            </a:br>
-            <a:r>
-              <a:rPr kumimoji="0" lang="en-US" altLang="en-US" sz="900" b="0" i="0" u="none" strike="noStrike" cap="none" normalizeH="0" baseline="0" dirty="0">
-                <a:ln>
-                  <a:noFill/>
-                </a:ln>
-                <a:solidFill>
-                  <a:srgbClr val="A9B7C6"/>
-                </a:solidFill>
-                <a:effectLst/>
-                <a:latin typeface="Courier New" panose="02070309020205020404" pitchFamily="49" charset="0"/>
-                <a:cs typeface="Courier New" panose="02070309020205020404" pitchFamily="49" charset="0"/>
-              </a:rPr>
-              <a:t>    </a:t>
-            </a:r>
-            <a:r>
-              <a:rPr kumimoji="0" lang="en-US" altLang="en-US" sz="900" b="0" i="0" u="none" strike="noStrike" cap="none" normalizeH="0" baseline="0" dirty="0">
-                <a:ln>
-                  <a:noFill/>
-                </a:ln>
-                <a:solidFill>
-                  <a:srgbClr val="BBB529"/>
-                </a:solidFill>
-                <a:effectLst/>
-                <a:latin typeface="Courier New" panose="02070309020205020404" pitchFamily="49" charset="0"/>
-                <a:cs typeface="Courier New" panose="02070309020205020404" pitchFamily="49" charset="0"/>
-              </a:rPr>
-              <a:t>@Bean</a:t>
-            </a:r>
-            <a:br>
-              <a:rPr kumimoji="0" lang="en-US" altLang="en-US" sz="900" b="0" i="0" u="none" strike="noStrike" cap="none" normalizeH="0" baseline="0" dirty="0">
-                <a:ln>
-                  <a:noFill/>
-                </a:ln>
-                <a:solidFill>
-                  <a:srgbClr val="BBB529"/>
-                </a:solidFill>
-                <a:effectLst/>
-                <a:latin typeface="Courier New" panose="02070309020205020404" pitchFamily="49" charset="0"/>
-                <a:cs typeface="Courier New" panose="02070309020205020404" pitchFamily="49" charset="0"/>
-              </a:rPr>
-            </a:br>
-            <a:r>
-              <a:rPr kumimoji="0" lang="en-US" altLang="en-US" sz="900" b="0" i="0" u="none" strike="noStrike" cap="none" normalizeH="0" baseline="0" dirty="0">
-                <a:ln>
-                  <a:noFill/>
-                </a:ln>
-                <a:solidFill>
-                  <a:srgbClr val="BBB529"/>
-                </a:solidFill>
-                <a:effectLst/>
-                <a:latin typeface="Courier New" panose="02070309020205020404" pitchFamily="49" charset="0"/>
-                <a:cs typeface="Courier New" panose="02070309020205020404" pitchFamily="49" charset="0"/>
-              </a:rPr>
-              <a:t>    </a:t>
-            </a:r>
-            <a:r>
-              <a:rPr kumimoji="0" lang="en-US" altLang="en-US" sz="900" b="0" i="0" u="none" strike="noStrike" cap="none" normalizeH="0" baseline="0" dirty="0">
-                <a:ln>
-                  <a:noFill/>
-                </a:ln>
-                <a:solidFill>
-                  <a:srgbClr val="CC7832"/>
-                </a:solidFill>
-                <a:effectLst/>
-                <a:latin typeface="Courier New" panose="02070309020205020404" pitchFamily="49" charset="0"/>
-                <a:cs typeface="Courier New" panose="02070309020205020404" pitchFamily="49" charset="0"/>
-              </a:rPr>
-              <a:t>public </a:t>
-            </a:r>
-            <a:r>
-              <a:rPr kumimoji="0" lang="en-US" altLang="en-US" sz="900" b="0" i="0" u="none" strike="noStrike" cap="none" normalizeH="0" baseline="0" dirty="0" err="1">
-                <a:ln>
-                  <a:noFill/>
-                </a:ln>
-                <a:solidFill>
-                  <a:srgbClr val="A9B7C6"/>
-                </a:solidFill>
-                <a:effectLst/>
-                <a:latin typeface="Courier New" panose="02070309020205020404" pitchFamily="49" charset="0"/>
-                <a:cs typeface="Courier New" panose="02070309020205020404" pitchFamily="49" charset="0"/>
-              </a:rPr>
-              <a:t>PlatformTransactionManager</a:t>
-            </a:r>
-            <a:r>
-              <a:rPr kumimoji="0" lang="en-US" altLang="en-US" sz="900" b="0" i="0" u="none" strike="noStrike" cap="none" normalizeH="0" baseline="0" dirty="0">
-                <a:ln>
-                  <a:noFill/>
-                </a:ln>
-                <a:solidFill>
-                  <a:srgbClr val="A9B7C6"/>
-                </a:solidFill>
-                <a:effectLst/>
-                <a:latin typeface="Courier New" panose="02070309020205020404" pitchFamily="49" charset="0"/>
-                <a:cs typeface="Courier New" panose="02070309020205020404" pitchFamily="49" charset="0"/>
-              </a:rPr>
-              <a:t> </a:t>
-            </a:r>
-            <a:r>
-              <a:rPr kumimoji="0" lang="en-US" altLang="en-US" sz="900" b="0" i="0" u="none" strike="noStrike" cap="none" normalizeH="0" baseline="0" dirty="0" err="1">
-                <a:ln>
-                  <a:noFill/>
-                </a:ln>
-                <a:solidFill>
-                  <a:srgbClr val="FFC66D"/>
-                </a:solidFill>
-                <a:effectLst/>
-                <a:latin typeface="Courier New" panose="02070309020205020404" pitchFamily="49" charset="0"/>
-                <a:cs typeface="Courier New" panose="02070309020205020404" pitchFamily="49" charset="0"/>
-              </a:rPr>
-              <a:t>transactionManager</a:t>
-            </a:r>
-            <a:r>
-              <a:rPr kumimoji="0" lang="en-US" altLang="en-US" sz="900" b="0" i="0" u="none" strike="noStrike" cap="none" normalizeH="0" baseline="0" dirty="0">
-                <a:ln>
-                  <a:noFill/>
-                </a:ln>
-                <a:solidFill>
-                  <a:srgbClr val="A9B7C6"/>
-                </a:solidFill>
-                <a:effectLst/>
-                <a:latin typeface="Courier New" panose="02070309020205020404" pitchFamily="49" charset="0"/>
-                <a:cs typeface="Courier New" panose="02070309020205020404" pitchFamily="49" charset="0"/>
-              </a:rPr>
-              <a:t>(Environment </a:t>
-            </a:r>
-            <a:r>
-              <a:rPr kumimoji="0" lang="en-US" altLang="en-US" sz="900" b="0" i="0" u="none" strike="noStrike" cap="none" normalizeH="0" baseline="0" dirty="0" err="1">
-                <a:ln>
-                  <a:noFill/>
-                </a:ln>
-                <a:solidFill>
-                  <a:srgbClr val="A9B7C6"/>
-                </a:solidFill>
-                <a:effectLst/>
-                <a:latin typeface="Courier New" panose="02070309020205020404" pitchFamily="49" charset="0"/>
-                <a:cs typeface="Courier New" panose="02070309020205020404" pitchFamily="49" charset="0"/>
-              </a:rPr>
-              <a:t>environment</a:t>
-            </a:r>
-            <a:r>
-              <a:rPr kumimoji="0" lang="en-US" altLang="en-US" sz="900" b="0" i="0" u="none" strike="noStrike" cap="none" normalizeH="0" baseline="0" dirty="0">
-                <a:ln>
-                  <a:noFill/>
-                </a:ln>
-                <a:solidFill>
-                  <a:srgbClr val="CC7832"/>
-                </a:solidFill>
-                <a:effectLst/>
-                <a:latin typeface="Courier New" panose="02070309020205020404" pitchFamily="49" charset="0"/>
-                <a:cs typeface="Courier New" panose="02070309020205020404" pitchFamily="49" charset="0"/>
-              </a:rPr>
-              <a:t>, </a:t>
-            </a:r>
-            <a:r>
-              <a:rPr kumimoji="0" lang="en-US" altLang="en-US" sz="900" b="0" i="0" u="none" strike="noStrike" cap="none" normalizeH="0" baseline="0" dirty="0" err="1">
-                <a:ln>
-                  <a:noFill/>
-                </a:ln>
-                <a:solidFill>
-                  <a:srgbClr val="A9B7C6"/>
-                </a:solidFill>
-                <a:effectLst/>
-                <a:latin typeface="Courier New" panose="02070309020205020404" pitchFamily="49" charset="0"/>
-                <a:cs typeface="Courier New" panose="02070309020205020404" pitchFamily="49" charset="0"/>
-              </a:rPr>
-              <a:t>DataSource</a:t>
-            </a:r>
-            <a:r>
-              <a:rPr kumimoji="0" lang="en-US" altLang="en-US" sz="900" b="0" i="0" u="none" strike="noStrike" cap="none" normalizeH="0" baseline="0" dirty="0">
-                <a:ln>
-                  <a:noFill/>
-                </a:ln>
-                <a:solidFill>
-                  <a:srgbClr val="A9B7C6"/>
-                </a:solidFill>
-                <a:effectLst/>
-                <a:latin typeface="Courier New" panose="02070309020205020404" pitchFamily="49" charset="0"/>
-                <a:cs typeface="Courier New" panose="02070309020205020404" pitchFamily="49" charset="0"/>
-              </a:rPr>
-              <a:t> </a:t>
-            </a:r>
-            <a:r>
-              <a:rPr kumimoji="0" lang="en-US" altLang="en-US" sz="900" b="0" i="0" u="none" strike="noStrike" cap="none" normalizeH="0" baseline="0" dirty="0" err="1">
-                <a:ln>
-                  <a:noFill/>
-                </a:ln>
-                <a:solidFill>
-                  <a:srgbClr val="A9B7C6"/>
-                </a:solidFill>
-                <a:effectLst/>
-                <a:latin typeface="Courier New" panose="02070309020205020404" pitchFamily="49" charset="0"/>
-                <a:cs typeface="Courier New" panose="02070309020205020404" pitchFamily="49" charset="0"/>
-              </a:rPr>
-              <a:t>dataSource</a:t>
-            </a:r>
-            <a:r>
-              <a:rPr kumimoji="0" lang="en-US" altLang="en-US" sz="900" b="0" i="0" u="none" strike="noStrike" cap="none" normalizeH="0" baseline="0" dirty="0">
-                <a:ln>
-                  <a:noFill/>
-                </a:ln>
-                <a:solidFill>
-                  <a:srgbClr val="A9B7C6"/>
-                </a:solidFill>
-                <a:effectLst/>
-                <a:latin typeface="Courier New" panose="02070309020205020404" pitchFamily="49" charset="0"/>
-                <a:cs typeface="Courier New" panose="02070309020205020404" pitchFamily="49" charset="0"/>
-              </a:rPr>
-              <a:t>) {</a:t>
-            </a:r>
-            <a:br>
-              <a:rPr kumimoji="0" lang="en-US" altLang="en-US" sz="900" b="0" i="0" u="none" strike="noStrike" cap="none" normalizeH="0" baseline="0" dirty="0">
-                <a:ln>
-                  <a:noFill/>
-                </a:ln>
-                <a:solidFill>
-                  <a:srgbClr val="A9B7C6"/>
-                </a:solidFill>
-                <a:effectLst/>
-                <a:latin typeface="Courier New" panose="02070309020205020404" pitchFamily="49" charset="0"/>
-                <a:cs typeface="Courier New" panose="02070309020205020404" pitchFamily="49" charset="0"/>
-              </a:rPr>
-            </a:br>
-            <a:r>
-              <a:rPr kumimoji="0" lang="en-US" altLang="en-US" sz="900" b="0" i="0" u="none" strike="noStrike" cap="none" normalizeH="0" baseline="0" dirty="0">
-                <a:ln>
-                  <a:noFill/>
-                </a:ln>
-                <a:solidFill>
-                  <a:srgbClr val="A9B7C6"/>
-                </a:solidFill>
-                <a:effectLst/>
-                <a:latin typeface="Courier New" panose="02070309020205020404" pitchFamily="49" charset="0"/>
-                <a:cs typeface="Courier New" panose="02070309020205020404" pitchFamily="49" charset="0"/>
-              </a:rPr>
-              <a:t>        </a:t>
-            </a:r>
-            <a:r>
-              <a:rPr kumimoji="0" lang="en-US" altLang="en-US" sz="900" b="0" i="0" u="none" strike="noStrike" cap="none" normalizeH="0" baseline="0" dirty="0" err="1">
-                <a:ln>
-                  <a:noFill/>
-                </a:ln>
-                <a:solidFill>
-                  <a:srgbClr val="A9B7C6"/>
-                </a:solidFill>
-                <a:effectLst/>
-                <a:latin typeface="Courier New" panose="02070309020205020404" pitchFamily="49" charset="0"/>
-                <a:cs typeface="Courier New" panose="02070309020205020404" pitchFamily="49" charset="0"/>
-              </a:rPr>
-              <a:t>JpaTransactionManager</a:t>
-            </a:r>
-            <a:r>
-              <a:rPr kumimoji="0" lang="en-US" altLang="en-US" sz="900" b="0" i="0" u="none" strike="noStrike" cap="none" normalizeH="0" baseline="0" dirty="0">
-                <a:ln>
-                  <a:noFill/>
-                </a:ln>
-                <a:solidFill>
-                  <a:srgbClr val="A9B7C6"/>
-                </a:solidFill>
-                <a:effectLst/>
-                <a:latin typeface="Courier New" panose="02070309020205020404" pitchFamily="49" charset="0"/>
-                <a:cs typeface="Courier New" panose="02070309020205020404" pitchFamily="49" charset="0"/>
-              </a:rPr>
-              <a:t> </a:t>
-            </a:r>
-            <a:r>
-              <a:rPr kumimoji="0" lang="en-US" altLang="en-US" sz="900" b="0" i="0" u="none" strike="noStrike" cap="none" normalizeH="0" baseline="0" dirty="0" err="1">
-                <a:ln>
-                  <a:noFill/>
-                </a:ln>
-                <a:solidFill>
-                  <a:srgbClr val="A9B7C6"/>
-                </a:solidFill>
-                <a:effectLst/>
-                <a:latin typeface="Courier New" panose="02070309020205020404" pitchFamily="49" charset="0"/>
-                <a:cs typeface="Courier New" panose="02070309020205020404" pitchFamily="49" charset="0"/>
-              </a:rPr>
-              <a:t>txManager</a:t>
-            </a:r>
-            <a:r>
-              <a:rPr kumimoji="0" lang="en-US" altLang="en-US" sz="900" b="0" i="0" u="none" strike="noStrike" cap="none" normalizeH="0" baseline="0" dirty="0">
-                <a:ln>
-                  <a:noFill/>
-                </a:ln>
-                <a:solidFill>
-                  <a:srgbClr val="A9B7C6"/>
-                </a:solidFill>
-                <a:effectLst/>
-                <a:latin typeface="Courier New" panose="02070309020205020404" pitchFamily="49" charset="0"/>
-                <a:cs typeface="Courier New" panose="02070309020205020404" pitchFamily="49" charset="0"/>
-              </a:rPr>
-              <a:t> = </a:t>
-            </a:r>
-            <a:r>
-              <a:rPr kumimoji="0" lang="en-US" altLang="en-US" sz="900" b="0" i="0" u="none" strike="noStrike" cap="none" normalizeH="0" baseline="0" dirty="0">
-                <a:ln>
-                  <a:noFill/>
-                </a:ln>
-                <a:solidFill>
-                  <a:srgbClr val="CC7832"/>
-                </a:solidFill>
-                <a:effectLst/>
-                <a:latin typeface="Courier New" panose="02070309020205020404" pitchFamily="49" charset="0"/>
-                <a:cs typeface="Courier New" panose="02070309020205020404" pitchFamily="49" charset="0"/>
-              </a:rPr>
-              <a:t>new </a:t>
-            </a:r>
-            <a:r>
-              <a:rPr kumimoji="0" lang="en-US" altLang="en-US" sz="900" b="0" i="0" u="none" strike="noStrike" cap="none" normalizeH="0" baseline="0" dirty="0" err="1">
-                <a:ln>
-                  <a:noFill/>
-                </a:ln>
-                <a:solidFill>
-                  <a:srgbClr val="A9B7C6"/>
-                </a:solidFill>
-                <a:effectLst/>
-                <a:latin typeface="Courier New" panose="02070309020205020404" pitchFamily="49" charset="0"/>
-                <a:cs typeface="Courier New" panose="02070309020205020404" pitchFamily="49" charset="0"/>
-              </a:rPr>
-              <a:t>JpaTransactionManager</a:t>
-            </a:r>
-            <a:r>
-              <a:rPr kumimoji="0" lang="en-US" altLang="en-US" sz="900" b="0" i="0" u="none" strike="noStrike" cap="none" normalizeH="0" baseline="0" dirty="0">
-                <a:ln>
-                  <a:noFill/>
-                </a:ln>
-                <a:solidFill>
-                  <a:srgbClr val="A9B7C6"/>
-                </a:solidFill>
-                <a:effectLst/>
-                <a:latin typeface="Courier New" panose="02070309020205020404" pitchFamily="49" charset="0"/>
-                <a:cs typeface="Courier New" panose="02070309020205020404" pitchFamily="49" charset="0"/>
-              </a:rPr>
-              <a:t>()</a:t>
-            </a:r>
-            <a:r>
-              <a:rPr kumimoji="0" lang="en-US" altLang="en-US" sz="900" b="0" i="0" u="none" strike="noStrike" cap="none" normalizeH="0" baseline="0" dirty="0">
-                <a:ln>
-                  <a:noFill/>
-                </a:ln>
-                <a:solidFill>
-                  <a:srgbClr val="CC7832"/>
-                </a:solidFill>
-                <a:effectLst/>
-                <a:latin typeface="Courier New" panose="02070309020205020404" pitchFamily="49" charset="0"/>
-                <a:cs typeface="Courier New" panose="02070309020205020404" pitchFamily="49" charset="0"/>
-              </a:rPr>
-              <a:t>;</a:t>
-            </a:r>
-            <a:br>
-              <a:rPr kumimoji="0" lang="en-US" altLang="en-US" sz="900" b="0" i="0" u="none" strike="noStrike" cap="none" normalizeH="0" baseline="0" dirty="0">
-                <a:ln>
-                  <a:noFill/>
-                </a:ln>
-                <a:solidFill>
-                  <a:srgbClr val="CC7832"/>
-                </a:solidFill>
-                <a:effectLst/>
-                <a:latin typeface="Courier New" panose="02070309020205020404" pitchFamily="49" charset="0"/>
-                <a:cs typeface="Courier New" panose="02070309020205020404" pitchFamily="49" charset="0"/>
-              </a:rPr>
-            </a:br>
-            <a:r>
-              <a:rPr kumimoji="0" lang="en-US" altLang="en-US" sz="900" b="0" i="0" u="none" strike="noStrike" cap="none" normalizeH="0" baseline="0" dirty="0">
-                <a:ln>
-                  <a:noFill/>
-                </a:ln>
-                <a:solidFill>
-                  <a:srgbClr val="CC7832"/>
-                </a:solidFill>
-                <a:effectLst/>
-                <a:latin typeface="Courier New" panose="02070309020205020404" pitchFamily="49" charset="0"/>
-                <a:cs typeface="Courier New" panose="02070309020205020404" pitchFamily="49" charset="0"/>
-              </a:rPr>
-              <a:t>        </a:t>
-            </a:r>
-            <a:r>
-              <a:rPr kumimoji="0" lang="en-US" altLang="en-US" sz="900" b="0" i="0" u="none" strike="noStrike" cap="none" normalizeH="0" baseline="0" dirty="0" err="1">
-                <a:ln>
-                  <a:noFill/>
-                </a:ln>
-                <a:solidFill>
-                  <a:srgbClr val="A9B7C6"/>
-                </a:solidFill>
-                <a:effectLst/>
-                <a:latin typeface="Courier New" panose="02070309020205020404" pitchFamily="49" charset="0"/>
-                <a:cs typeface="Courier New" panose="02070309020205020404" pitchFamily="49" charset="0"/>
-              </a:rPr>
-              <a:t>txManager.setEntityManagerFactory</a:t>
-            </a:r>
-            <a:r>
-              <a:rPr kumimoji="0" lang="en-US" altLang="en-US" sz="900" b="0" i="0" u="none" strike="noStrike" cap="none" normalizeH="0" baseline="0" dirty="0">
-                <a:ln>
-                  <a:noFill/>
-                </a:ln>
-                <a:solidFill>
-                  <a:srgbClr val="A9B7C6"/>
-                </a:solidFill>
-                <a:effectLst/>
-                <a:latin typeface="Courier New" panose="02070309020205020404" pitchFamily="49" charset="0"/>
-                <a:cs typeface="Courier New" panose="02070309020205020404" pitchFamily="49" charset="0"/>
-              </a:rPr>
-              <a:t>(</a:t>
-            </a:r>
-            <a:r>
-              <a:rPr kumimoji="0" lang="en-US" altLang="en-US" sz="900" b="0" i="0" u="none" strike="noStrike" cap="none" normalizeH="0" baseline="0" dirty="0" err="1">
-                <a:ln>
-                  <a:noFill/>
-                </a:ln>
-                <a:solidFill>
-                  <a:srgbClr val="A9B7C6"/>
-                </a:solidFill>
-                <a:effectLst/>
-                <a:latin typeface="Courier New" panose="02070309020205020404" pitchFamily="49" charset="0"/>
-                <a:cs typeface="Courier New" panose="02070309020205020404" pitchFamily="49" charset="0"/>
-              </a:rPr>
-              <a:t>entityManagerFactory</a:t>
-            </a:r>
-            <a:r>
-              <a:rPr kumimoji="0" lang="en-US" altLang="en-US" sz="900" b="0" i="0" u="none" strike="noStrike" cap="none" normalizeH="0" baseline="0" dirty="0">
-                <a:ln>
-                  <a:noFill/>
-                </a:ln>
-                <a:solidFill>
-                  <a:srgbClr val="A9B7C6"/>
-                </a:solidFill>
-                <a:effectLst/>
-                <a:latin typeface="Courier New" panose="02070309020205020404" pitchFamily="49" charset="0"/>
-                <a:cs typeface="Courier New" panose="02070309020205020404" pitchFamily="49" charset="0"/>
-              </a:rPr>
-              <a:t>(environment</a:t>
-            </a:r>
-            <a:r>
-              <a:rPr kumimoji="0" lang="en-US" altLang="en-US" sz="900" b="0" i="0" u="none" strike="noStrike" cap="none" normalizeH="0" baseline="0" dirty="0">
-                <a:ln>
-                  <a:noFill/>
-                </a:ln>
-                <a:solidFill>
-                  <a:srgbClr val="CC7832"/>
-                </a:solidFill>
-                <a:effectLst/>
-                <a:latin typeface="Courier New" panose="02070309020205020404" pitchFamily="49" charset="0"/>
-                <a:cs typeface="Courier New" panose="02070309020205020404" pitchFamily="49" charset="0"/>
-              </a:rPr>
-              <a:t>, </a:t>
-            </a:r>
-            <a:r>
-              <a:rPr kumimoji="0" lang="en-US" altLang="en-US" sz="900" b="0" i="0" u="none" strike="noStrike" cap="none" normalizeH="0" baseline="0" dirty="0" err="1">
-                <a:ln>
-                  <a:noFill/>
-                </a:ln>
-                <a:solidFill>
-                  <a:srgbClr val="A9B7C6"/>
-                </a:solidFill>
-                <a:effectLst/>
-                <a:latin typeface="Courier New" panose="02070309020205020404" pitchFamily="49" charset="0"/>
-                <a:cs typeface="Courier New" panose="02070309020205020404" pitchFamily="49" charset="0"/>
-              </a:rPr>
-              <a:t>dataSource</a:t>
-            </a:r>
-            <a:r>
-              <a:rPr kumimoji="0" lang="en-US" altLang="en-US" sz="900" b="0" i="0" u="none" strike="noStrike" cap="none" normalizeH="0" baseline="0" dirty="0">
-                <a:ln>
-                  <a:noFill/>
-                </a:ln>
-                <a:solidFill>
-                  <a:srgbClr val="A9B7C6"/>
-                </a:solidFill>
-                <a:effectLst/>
-                <a:latin typeface="Courier New" panose="02070309020205020404" pitchFamily="49" charset="0"/>
-                <a:cs typeface="Courier New" panose="02070309020205020404" pitchFamily="49" charset="0"/>
-              </a:rPr>
-              <a:t>))</a:t>
-            </a:r>
-            <a:r>
-              <a:rPr kumimoji="0" lang="en-US" altLang="en-US" sz="900" b="0" i="0" u="none" strike="noStrike" cap="none" normalizeH="0" baseline="0" dirty="0">
-                <a:ln>
-                  <a:noFill/>
-                </a:ln>
-                <a:solidFill>
-                  <a:srgbClr val="CC7832"/>
-                </a:solidFill>
-                <a:effectLst/>
-                <a:latin typeface="Courier New" panose="02070309020205020404" pitchFamily="49" charset="0"/>
-                <a:cs typeface="Courier New" panose="02070309020205020404" pitchFamily="49" charset="0"/>
-              </a:rPr>
-              <a:t>;</a:t>
-            </a:r>
-            <a:br>
-              <a:rPr kumimoji="0" lang="en-US" altLang="en-US" sz="900" b="0" i="0" u="none" strike="noStrike" cap="none" normalizeH="0" baseline="0" dirty="0">
-                <a:ln>
-                  <a:noFill/>
-                </a:ln>
-                <a:solidFill>
-                  <a:srgbClr val="CC7832"/>
-                </a:solidFill>
-                <a:effectLst/>
-                <a:latin typeface="Courier New" panose="02070309020205020404" pitchFamily="49" charset="0"/>
-                <a:cs typeface="Courier New" panose="02070309020205020404" pitchFamily="49" charset="0"/>
-              </a:rPr>
-            </a:br>
-            <a:r>
-              <a:rPr kumimoji="0" lang="en-US" altLang="en-US" sz="900" b="0" i="0" u="none" strike="noStrike" cap="none" normalizeH="0" baseline="0" dirty="0">
-                <a:ln>
-                  <a:noFill/>
-                </a:ln>
-                <a:solidFill>
-                  <a:srgbClr val="CC7832"/>
-                </a:solidFill>
-                <a:effectLst/>
-                <a:latin typeface="Courier New" panose="02070309020205020404" pitchFamily="49" charset="0"/>
-                <a:cs typeface="Courier New" panose="02070309020205020404" pitchFamily="49" charset="0"/>
-              </a:rPr>
-              <a:t>        </a:t>
-            </a:r>
-            <a:r>
-              <a:rPr kumimoji="0" lang="en-US" altLang="en-US" sz="900" b="0" i="0" u="none" strike="noStrike" cap="none" normalizeH="0" baseline="0" dirty="0" err="1">
-                <a:ln>
-                  <a:noFill/>
-                </a:ln>
-                <a:solidFill>
-                  <a:srgbClr val="A9B7C6"/>
-                </a:solidFill>
-                <a:effectLst/>
-                <a:latin typeface="Courier New" panose="02070309020205020404" pitchFamily="49" charset="0"/>
-                <a:cs typeface="Courier New" panose="02070309020205020404" pitchFamily="49" charset="0"/>
-              </a:rPr>
-              <a:t>txManager.setDataSource</a:t>
-            </a:r>
-            <a:r>
-              <a:rPr kumimoji="0" lang="en-US" altLang="en-US" sz="900" b="0" i="0" u="none" strike="noStrike" cap="none" normalizeH="0" baseline="0" dirty="0">
-                <a:ln>
-                  <a:noFill/>
-                </a:ln>
-                <a:solidFill>
-                  <a:srgbClr val="A9B7C6"/>
-                </a:solidFill>
-                <a:effectLst/>
-                <a:latin typeface="Courier New" panose="02070309020205020404" pitchFamily="49" charset="0"/>
-                <a:cs typeface="Courier New" panose="02070309020205020404" pitchFamily="49" charset="0"/>
-              </a:rPr>
-              <a:t>(</a:t>
-            </a:r>
-            <a:r>
-              <a:rPr kumimoji="0" lang="en-US" altLang="en-US" sz="900" b="0" i="0" u="none" strike="noStrike" cap="none" normalizeH="0" baseline="0" dirty="0" err="1">
-                <a:ln>
-                  <a:noFill/>
-                </a:ln>
-                <a:solidFill>
-                  <a:srgbClr val="A9B7C6"/>
-                </a:solidFill>
-                <a:effectLst/>
-                <a:latin typeface="Courier New" panose="02070309020205020404" pitchFamily="49" charset="0"/>
-                <a:cs typeface="Courier New" panose="02070309020205020404" pitchFamily="49" charset="0"/>
-              </a:rPr>
-              <a:t>dataSource</a:t>
-            </a:r>
-            <a:r>
-              <a:rPr kumimoji="0" lang="en-US" altLang="en-US" sz="900" b="0" i="0" u="none" strike="noStrike" cap="none" normalizeH="0" baseline="0" dirty="0">
-                <a:ln>
-                  <a:noFill/>
-                </a:ln>
-                <a:solidFill>
-                  <a:srgbClr val="A9B7C6"/>
-                </a:solidFill>
-                <a:effectLst/>
-                <a:latin typeface="Courier New" panose="02070309020205020404" pitchFamily="49" charset="0"/>
-                <a:cs typeface="Courier New" panose="02070309020205020404" pitchFamily="49" charset="0"/>
-              </a:rPr>
-              <a:t>)</a:t>
-            </a:r>
-            <a:r>
-              <a:rPr kumimoji="0" lang="en-US" altLang="en-US" sz="900" b="0" i="0" u="none" strike="noStrike" cap="none" normalizeH="0" baseline="0" dirty="0">
-                <a:ln>
-                  <a:noFill/>
-                </a:ln>
-                <a:solidFill>
-                  <a:srgbClr val="CC7832"/>
-                </a:solidFill>
-                <a:effectLst/>
-                <a:latin typeface="Courier New" panose="02070309020205020404" pitchFamily="49" charset="0"/>
-                <a:cs typeface="Courier New" panose="02070309020205020404" pitchFamily="49" charset="0"/>
-              </a:rPr>
-              <a:t>;</a:t>
-            </a:r>
-            <a:br>
-              <a:rPr kumimoji="0" lang="en-US" altLang="en-US" sz="900" b="0" i="0" u="none" strike="noStrike" cap="none" normalizeH="0" baseline="0" dirty="0">
-                <a:ln>
-                  <a:noFill/>
-                </a:ln>
-                <a:solidFill>
-                  <a:srgbClr val="CC7832"/>
-                </a:solidFill>
-                <a:effectLst/>
-                <a:latin typeface="Courier New" panose="02070309020205020404" pitchFamily="49" charset="0"/>
-                <a:cs typeface="Courier New" panose="02070309020205020404" pitchFamily="49" charset="0"/>
-              </a:rPr>
-            </a:br>
-            <a:r>
-              <a:rPr kumimoji="0" lang="en-US" altLang="en-US" sz="900" b="0" i="0" u="none" strike="noStrike" cap="none" normalizeH="0" baseline="0" dirty="0">
-                <a:ln>
-                  <a:noFill/>
-                </a:ln>
-                <a:solidFill>
-                  <a:srgbClr val="CC7832"/>
-                </a:solidFill>
-                <a:effectLst/>
-                <a:latin typeface="Courier New" panose="02070309020205020404" pitchFamily="49" charset="0"/>
-                <a:cs typeface="Courier New" panose="02070309020205020404" pitchFamily="49" charset="0"/>
-              </a:rPr>
-              <a:t>        return </a:t>
-            </a:r>
-            <a:r>
-              <a:rPr kumimoji="0" lang="en-US" altLang="en-US" sz="900" b="0" i="0" u="none" strike="noStrike" cap="none" normalizeH="0" baseline="0" dirty="0" err="1">
-                <a:ln>
-                  <a:noFill/>
-                </a:ln>
-                <a:solidFill>
-                  <a:srgbClr val="A9B7C6"/>
-                </a:solidFill>
-                <a:effectLst/>
-                <a:latin typeface="Courier New" panose="02070309020205020404" pitchFamily="49" charset="0"/>
-                <a:cs typeface="Courier New" panose="02070309020205020404" pitchFamily="49" charset="0"/>
-              </a:rPr>
-              <a:t>txManager</a:t>
-            </a:r>
-            <a:r>
-              <a:rPr kumimoji="0" lang="en-US" altLang="en-US" sz="900" b="0" i="0" u="none" strike="noStrike" cap="none" normalizeH="0" baseline="0" dirty="0">
-                <a:ln>
-                  <a:noFill/>
-                </a:ln>
-                <a:solidFill>
-                  <a:srgbClr val="CC7832"/>
-                </a:solidFill>
-                <a:effectLst/>
-                <a:latin typeface="Courier New" panose="02070309020205020404" pitchFamily="49" charset="0"/>
-                <a:cs typeface="Courier New" panose="02070309020205020404" pitchFamily="49" charset="0"/>
-              </a:rPr>
-              <a:t>;</a:t>
-            </a:r>
-            <a:br>
-              <a:rPr kumimoji="0" lang="en-US" altLang="en-US" sz="900" b="0" i="0" u="none" strike="noStrike" cap="none" normalizeH="0" baseline="0" dirty="0">
-                <a:ln>
-                  <a:noFill/>
-                </a:ln>
-                <a:solidFill>
-                  <a:srgbClr val="CC7832"/>
-                </a:solidFill>
-                <a:effectLst/>
-                <a:latin typeface="Courier New" panose="02070309020205020404" pitchFamily="49" charset="0"/>
-                <a:cs typeface="Courier New" panose="02070309020205020404" pitchFamily="49" charset="0"/>
-              </a:rPr>
-            </a:br>
-            <a:r>
-              <a:rPr kumimoji="0" lang="en-US" altLang="en-US" sz="900" b="0" i="0" u="none" strike="noStrike" cap="none" normalizeH="0" baseline="0" dirty="0">
-                <a:ln>
-                  <a:noFill/>
-                </a:ln>
-                <a:solidFill>
-                  <a:srgbClr val="CC7832"/>
-                </a:solidFill>
-                <a:effectLst/>
-                <a:latin typeface="Courier New" panose="02070309020205020404" pitchFamily="49" charset="0"/>
-                <a:cs typeface="Courier New" panose="02070309020205020404" pitchFamily="49" charset="0"/>
-              </a:rPr>
-              <a:t>    </a:t>
-            </a:r>
-            <a:r>
-              <a:rPr kumimoji="0" lang="en-US" altLang="en-US" sz="900" b="0" i="0" u="none" strike="noStrike" cap="none" normalizeH="0" baseline="0" dirty="0">
-                <a:ln>
-                  <a:noFill/>
-                </a:ln>
-                <a:solidFill>
-                  <a:srgbClr val="A9B7C6"/>
-                </a:solidFill>
-                <a:effectLst/>
-                <a:latin typeface="Courier New" panose="02070309020205020404" pitchFamily="49" charset="0"/>
-                <a:cs typeface="Courier New" panose="02070309020205020404" pitchFamily="49" charset="0"/>
-              </a:rPr>
-              <a:t>}</a:t>
-            </a:r>
-          </a:p>
-          <a:p>
-            <a:pPr marL="0" marR="0" lvl="0" indent="0" algn="l" defTabSz="914400" rtl="0" eaLnBrk="0" fontAlgn="base" latinLnBrk="0" hangingPunct="0">
-              <a:lnSpc>
-                <a:spcPct val="100000"/>
-              </a:lnSpc>
-              <a:spcBef>
-                <a:spcPct val="0"/>
-              </a:spcBef>
-              <a:spcAft>
-                <a:spcPct val="0"/>
-              </a:spcAft>
-              <a:buClrTx/>
-              <a:buSzTx/>
-              <a:buFontTx/>
-              <a:buNone/>
-              <a:tabLst/>
-            </a:pPr>
-            <a:r>
-              <a:rPr kumimoji="0" lang="en-US" altLang="en-US" sz="900" b="0" i="0" u="none" strike="noStrike" cap="none" normalizeH="0" baseline="0" dirty="0">
-                <a:ln>
-                  <a:noFill/>
-                </a:ln>
-                <a:solidFill>
-                  <a:srgbClr val="A9B7C6"/>
-                </a:solidFill>
-                <a:effectLst/>
-                <a:latin typeface="Courier New" panose="02070309020205020404" pitchFamily="49" charset="0"/>
-                <a:cs typeface="Courier New" panose="02070309020205020404" pitchFamily="49" charset="0"/>
-              </a:rPr>
-              <a:t>}</a:t>
-            </a:r>
-            <a:endParaRPr kumimoji="0" lang="en-US" altLang="en-US" sz="1800" b="0" i="0" u="none" strike="noStrike" cap="none" normalizeH="0" baseline="0" dirty="0">
-              <a:ln>
-                <a:noFill/>
-              </a:ln>
-              <a:solidFill>
-                <a:schemeClr val="tx1"/>
-              </a:solidFill>
-              <a:effectLst/>
-              <a:latin typeface="Arial" panose="020B0604020202020204" pitchFamily="34" charset="0"/>
-            </a:endParaRPr>
+            <a:pPr lvl="1"/>
+            <a:r>
+              <a:rPr lang="en-US" dirty="0">
+                <a:hlinkClick r:id="rId3"/>
+              </a:rPr>
+              <a:t>Hibernate</a:t>
+            </a:r>
+            <a:endParaRPr lang="en-US" dirty="0"/>
+          </a:p>
+          <a:p>
+            <a:pPr lvl="1"/>
+            <a:r>
+              <a:rPr lang="en-US" dirty="0">
+                <a:hlinkClick r:id="rId4"/>
+              </a:rPr>
+              <a:t>Hibernate Tutorial</a:t>
+            </a:r>
+            <a:endParaRPr lang="en-US" dirty="0"/>
+          </a:p>
+          <a:p>
+            <a:pPr lvl="1"/>
+            <a:r>
+              <a:rPr lang="en-US" dirty="0">
+                <a:hlinkClick r:id="rId5"/>
+              </a:rPr>
+              <a:t>Spring Data JPA</a:t>
+            </a:r>
+            <a:endParaRPr lang="en-US" dirty="0"/>
+          </a:p>
+          <a:p>
+            <a:pPr lvl="1"/>
+            <a:r>
+              <a:rPr lang="en-US" dirty="0">
+                <a:hlinkClick r:id="rId6"/>
+              </a:rPr>
+              <a:t>Spring Data JPA</a:t>
+            </a:r>
+            <a:endParaRPr lang="en-US" dirty="0"/>
+          </a:p>
+          <a:p>
+            <a:pPr lvl="1"/>
+            <a:r>
+              <a:rPr lang="en-US" dirty="0">
+                <a:hlinkClick r:id="rId7"/>
+              </a:rPr>
+              <a:t>Spring Data JPA </a:t>
+            </a:r>
+            <a:r>
+              <a:rPr lang="en-US" dirty="0" err="1">
+                <a:hlinkClick r:id="rId7"/>
+              </a:rPr>
+              <a:t>Habr</a:t>
+            </a:r>
+            <a:endParaRPr lang="en-US" dirty="0"/>
+          </a:p>
+          <a:p>
+            <a:pPr lvl="1"/>
+            <a:r>
+              <a:rPr lang="en-US" dirty="0">
+                <a:hlinkClick r:id="rId8"/>
+              </a:rPr>
+              <a:t>Spring Data </a:t>
+            </a:r>
+            <a:r>
+              <a:rPr lang="en-US" dirty="0" err="1">
+                <a:hlinkClick r:id="rId8"/>
+              </a:rPr>
+              <a:t>Jdbc</a:t>
+            </a:r>
+            <a:endParaRPr lang="en-US" dirty="0"/>
           </a:p>
         </p:txBody>
       </p:sp>
     </p:spTree>
     <p:extLst>
       <p:ext uri="{BB962C8B-B14F-4D97-AF65-F5344CB8AC3E}">
-        <p14:creationId xmlns:p14="http://schemas.microsoft.com/office/powerpoint/2010/main" val="1106921338"/>
+        <p14:creationId xmlns:p14="http://schemas.microsoft.com/office/powerpoint/2010/main" val="436694527"/>
       </p:ext>
     </p:extLst>
   </p:cSld>
@@ -11420,9 +8730,8 @@
           <a:p>
             <a:r>
               <a:rPr lang="en-US" dirty="0"/>
-              <a:t>Literature</a:t>
-            </a:r>
-            <a:endParaRPr lang="ru-RU" dirty="0"/>
+              <a:t>Homework 1</a:t>
+            </a:r>
           </a:p>
         </p:txBody>
       </p:sp>
@@ -11443,83 +8752,54 @@
           </a:bodyPr>
           <a:lstStyle/>
           <a:p>
-            <a:pPr lvl="1"/>
-            <a:r>
-              <a:rPr lang="en-US" dirty="0">
-                <a:hlinkClick r:id="rId3"/>
-              </a:rPr>
-              <a:t>Hibernate</a:t>
-            </a:r>
-            <a:endParaRPr lang="en-US" dirty="0"/>
-          </a:p>
-          <a:p>
-            <a:pPr lvl="1"/>
-            <a:r>
-              <a:rPr lang="en-US" dirty="0">
-                <a:hlinkClick r:id="rId4"/>
-              </a:rPr>
-              <a:t>Hibernate Tutorial</a:t>
-            </a:r>
-            <a:endParaRPr lang="en-US" dirty="0"/>
-          </a:p>
-          <a:p>
-            <a:pPr lvl="1"/>
-            <a:r>
-              <a:rPr lang="en-US" dirty="0">
-                <a:hlinkClick r:id="rId5"/>
-              </a:rPr>
-              <a:t>Spring Data JPA</a:t>
-            </a:r>
-            <a:endParaRPr lang="en-US" dirty="0"/>
-          </a:p>
-          <a:p>
-            <a:pPr lvl="1"/>
-            <a:r>
-              <a:rPr lang="en-US" dirty="0">
-                <a:hlinkClick r:id="rId6"/>
-              </a:rPr>
-              <a:t>Spring Data JPA</a:t>
-            </a:r>
-            <a:endParaRPr lang="en-US" dirty="0"/>
-          </a:p>
-          <a:p>
-            <a:pPr lvl="1"/>
-            <a:r>
-              <a:rPr lang="en-US" dirty="0">
-                <a:hlinkClick r:id="rId7"/>
-              </a:rPr>
-              <a:t>Spring Data JPA </a:t>
-            </a:r>
-            <a:r>
-              <a:rPr lang="en-US" dirty="0" err="1">
-                <a:hlinkClick r:id="rId7"/>
-              </a:rPr>
-              <a:t>Habr</a:t>
-            </a:r>
-            <a:endParaRPr lang="en-US" dirty="0"/>
-          </a:p>
-          <a:p>
-            <a:pPr lvl="1"/>
-            <a:r>
-              <a:rPr lang="en-US" dirty="0">
-                <a:hlinkClick r:id="rId8"/>
-              </a:rPr>
-              <a:t>Spring Data </a:t>
-            </a:r>
-            <a:r>
-              <a:rPr lang="en-US" dirty="0" err="1">
-                <a:hlinkClick r:id="rId8"/>
-              </a:rPr>
-              <a:t>Jdbc</a:t>
-            </a:r>
-            <a:endParaRPr lang="en-US" dirty="0"/>
+            <a:pPr marL="514350" indent="-514350">
+              <a:lnSpc>
+                <a:spcPct val="150000"/>
+              </a:lnSpc>
+              <a:buFont typeface="+mj-lt"/>
+              <a:buAutoNum type="arabicPeriod"/>
+            </a:pPr>
+            <a:r>
+              <a:rPr lang="en-US" dirty="0"/>
+              <a:t>Use Spring Boot to create WEB application from </a:t>
+            </a:r>
+            <a:r>
+              <a:rPr lang="en-US" b="1" dirty="0"/>
+              <a:t>Lecture 18</a:t>
+            </a:r>
+          </a:p>
+          <a:p>
+            <a:pPr marL="514350" indent="-514350">
+              <a:lnSpc>
+                <a:spcPct val="150000"/>
+              </a:lnSpc>
+              <a:buFont typeface="+mj-lt"/>
+              <a:buAutoNum type="arabicPeriod"/>
+            </a:pPr>
+            <a:r>
+              <a:rPr lang="en-US" dirty="0"/>
+              <a:t>Use database as storage for all data</a:t>
+            </a:r>
+          </a:p>
+          <a:p>
+            <a:pPr marL="514350" indent="-514350">
+              <a:lnSpc>
+                <a:spcPct val="150000"/>
+              </a:lnSpc>
+              <a:buFont typeface="+mj-lt"/>
+              <a:buAutoNum type="arabicPeriod"/>
+            </a:pPr>
+            <a:r>
+              <a:rPr lang="en-US" dirty="0"/>
+              <a:t>Use Hibernate or Spring Data to select/insert/update/delete all required data from/into database</a:t>
+            </a:r>
           </a:p>
         </p:txBody>
       </p:sp>
     </p:spTree>
     <p:extLst>
       <p:ext uri="{BB962C8B-B14F-4D97-AF65-F5344CB8AC3E}">
-        <p14:creationId xmlns:p14="http://schemas.microsoft.com/office/powerpoint/2010/main" val="436694527"/>
+        <p14:creationId xmlns:p14="http://schemas.microsoft.com/office/powerpoint/2010/main" val="3047869406"/>
       </p:ext>
     </p:extLst>
   </p:cSld>

</xml_diff>